<commit_message>
Update to profile slide and various fixes.
</commit_message>
<xml_diff>
--- a/2024-SoFloDevCon/2024-05-04-Software-Composition_Analysis.pptx
+++ b/2024-SoFloDevCon/2024-05-04-Software-Composition_Analysis.pptx
@@ -519,7 +519,7 @@
           </c:val>
           <c:extLst>
             <c:ext xmlns:c16="http://schemas.microsoft.com/office/drawing/2014/chart" uri="{C3380CC4-5D6E-409C-BE32-E72D297353CC}">
-              <c16:uniqueId val="{00000000-5C05-2C4D-8809-123A33168907}"/>
+              <c16:uniqueId val="{00000000-58C5-3D41-A2E7-F56C045F21C2}"/>
             </c:ext>
           </c:extLst>
         </c:ser>
@@ -963,7 +963,7 @@
       </p:grpSpPr>
       <p:sp>
         <p:nvSpPr>
-          <p:cNvPr id="430" name="Shape 430"/>
+          <p:cNvPr id="434" name="Shape 434"/>
           <p:cNvSpPr>
             <a:spLocks noGrp="1" noRot="1" noChangeAspect="1"/>
           </p:cNvSpPr>
@@ -986,7 +986,7 @@
       </p:sp>
       <p:sp>
         <p:nvSpPr>
-          <p:cNvPr id="431" name="Shape 431"/>
+          <p:cNvPr id="435" name="Shape 435"/>
           <p:cNvSpPr>
             <a:spLocks noGrp="1"/>
           </p:cNvSpPr>
@@ -1036,7 +1036,7 @@
       </p:grpSpPr>
       <p:sp>
         <p:nvSpPr>
-          <p:cNvPr id="465" name="Shape 465"/>
+          <p:cNvPr id="469" name="Shape 469"/>
           <p:cNvSpPr>
             <a:spLocks noGrp="1" noRot="1" noChangeAspect="1"/>
           </p:cNvSpPr>
@@ -1045,10 +1045,6 @@
           </p:nvPr>
         </p:nvSpPr>
         <p:spPr>
-          <a:xfrm>
-            <a:off x="381000" y="685800"/>
-            <a:ext cx="6096000" cy="3429000"/>
-          </a:xfrm>
           <a:prstGeom prst="rect">
             <a:avLst/>
           </a:prstGeom>
@@ -1063,7 +1059,7 @@
       </p:sp>
       <p:sp>
         <p:nvSpPr>
-          <p:cNvPr id="466" name="Shape 466"/>
+          <p:cNvPr id="470" name="Shape 470"/>
           <p:cNvSpPr>
             <a:spLocks noGrp="1"/>
           </p:cNvSpPr>
@@ -1118,7 +1114,7 @@
       </p:grpSpPr>
       <p:sp>
         <p:nvSpPr>
-          <p:cNvPr id="474" name="Shape 474"/>
+          <p:cNvPr id="478" name="Shape 478"/>
           <p:cNvSpPr>
             <a:spLocks noGrp="1" noRot="1" noChangeAspect="1"/>
           </p:cNvSpPr>
@@ -1145,7 +1141,7 @@
       </p:sp>
       <p:sp>
         <p:nvSpPr>
-          <p:cNvPr id="475" name="Shape 475"/>
+          <p:cNvPr id="479" name="Shape 479"/>
           <p:cNvSpPr>
             <a:spLocks noGrp="1"/>
           </p:cNvSpPr>
@@ -1195,7 +1191,7 @@
       </p:grpSpPr>
       <p:sp>
         <p:nvSpPr>
-          <p:cNvPr id="492" name="Shape 492"/>
+          <p:cNvPr id="496" name="Shape 496"/>
           <p:cNvSpPr>
             <a:spLocks noGrp="1" noRot="1" noChangeAspect="1"/>
           </p:cNvSpPr>
@@ -1218,7 +1214,7 @@
       </p:sp>
       <p:sp>
         <p:nvSpPr>
-          <p:cNvPr id="493" name="Shape 493"/>
+          <p:cNvPr id="497" name="Shape 497"/>
           <p:cNvSpPr>
             <a:spLocks noGrp="1"/>
           </p:cNvSpPr>
@@ -1268,7 +1264,7 @@
       </p:grpSpPr>
       <p:sp>
         <p:nvSpPr>
-          <p:cNvPr id="510" name="Shape 510"/>
+          <p:cNvPr id="514" name="Shape 514"/>
           <p:cNvSpPr>
             <a:spLocks noGrp="1" noRot="1" noChangeAspect="1"/>
           </p:cNvSpPr>
@@ -1291,7 +1287,7 @@
       </p:sp>
       <p:sp>
         <p:nvSpPr>
-          <p:cNvPr id="511" name="Shape 511"/>
+          <p:cNvPr id="515" name="Shape 515"/>
           <p:cNvSpPr>
             <a:spLocks noGrp="1"/>
           </p:cNvSpPr>
@@ -1346,7 +1342,7 @@
       </p:grpSpPr>
       <p:sp>
         <p:nvSpPr>
-          <p:cNvPr id="518" name="Shape 518"/>
+          <p:cNvPr id="522" name="Shape 522"/>
           <p:cNvSpPr>
             <a:spLocks noGrp="1" noRot="1" noChangeAspect="1"/>
           </p:cNvSpPr>
@@ -1369,7 +1365,7 @@
       </p:sp>
       <p:sp>
         <p:nvSpPr>
-          <p:cNvPr id="519" name="Shape 519"/>
+          <p:cNvPr id="523" name="Shape 523"/>
           <p:cNvSpPr>
             <a:spLocks noGrp="1"/>
           </p:cNvSpPr>
@@ -1424,7 +1420,7 @@
       </p:grpSpPr>
       <p:sp>
         <p:nvSpPr>
-          <p:cNvPr id="527" name="Shape 527"/>
+          <p:cNvPr id="531" name="Shape 531"/>
           <p:cNvSpPr>
             <a:spLocks noGrp="1" noRot="1" noChangeAspect="1"/>
           </p:cNvSpPr>
@@ -1447,7 +1443,7 @@
       </p:sp>
       <p:sp>
         <p:nvSpPr>
-          <p:cNvPr id="528" name="Shape 528"/>
+          <p:cNvPr id="532" name="Shape 532"/>
           <p:cNvSpPr>
             <a:spLocks noGrp="1"/>
           </p:cNvSpPr>
@@ -1502,7 +1498,7 @@
       </p:grpSpPr>
       <p:sp>
         <p:nvSpPr>
-          <p:cNvPr id="536" name="Shape 536"/>
+          <p:cNvPr id="540" name="Shape 540"/>
           <p:cNvSpPr>
             <a:spLocks noGrp="1" noRot="1" noChangeAspect="1"/>
           </p:cNvSpPr>
@@ -1525,7 +1521,7 @@
       </p:sp>
       <p:sp>
         <p:nvSpPr>
-          <p:cNvPr id="537" name="Shape 537"/>
+          <p:cNvPr id="541" name="Shape 541"/>
           <p:cNvSpPr>
             <a:spLocks noGrp="1"/>
           </p:cNvSpPr>
@@ -1575,7 +1571,7 @@
       </p:grpSpPr>
       <p:sp>
         <p:nvSpPr>
-          <p:cNvPr id="543" name="Shape 543"/>
+          <p:cNvPr id="547" name="Shape 547"/>
           <p:cNvSpPr>
             <a:spLocks noGrp="1" noRot="1" noChangeAspect="1"/>
           </p:cNvSpPr>
@@ -1598,7 +1594,7 @@
       </p:sp>
       <p:sp>
         <p:nvSpPr>
-          <p:cNvPr id="544" name="Shape 544"/>
+          <p:cNvPr id="548" name="Shape 548"/>
           <p:cNvSpPr>
             <a:spLocks noGrp="1"/>
           </p:cNvSpPr>
@@ -1663,7 +1659,7 @@
       </p:grpSpPr>
       <p:sp>
         <p:nvSpPr>
-          <p:cNvPr id="584" name="Shape 584"/>
+          <p:cNvPr id="588" name="Shape 588"/>
           <p:cNvSpPr>
             <a:spLocks noGrp="1" noRot="1" noChangeAspect="1"/>
           </p:cNvSpPr>
@@ -1686,7 +1682,7 @@
       </p:sp>
       <p:sp>
         <p:nvSpPr>
-          <p:cNvPr id="585" name="Shape 585"/>
+          <p:cNvPr id="589" name="Shape 589"/>
           <p:cNvSpPr>
             <a:spLocks noGrp="1"/>
           </p:cNvSpPr>
@@ -1751,7 +1747,7 @@
       </p:grpSpPr>
       <p:sp>
         <p:nvSpPr>
-          <p:cNvPr id="188" name="Shape 188"/>
+          <p:cNvPr id="192" name="Shape 192"/>
           <p:cNvSpPr>
             <a:spLocks noGrp="1" noRot="1" noChangeAspect="1"/>
           </p:cNvSpPr>
@@ -1778,7 +1774,7 @@
       </p:sp>
       <p:sp>
         <p:nvSpPr>
-          <p:cNvPr id="189" name="Shape 189"/>
+          <p:cNvPr id="193" name="Shape 193"/>
           <p:cNvSpPr>
             <a:spLocks noGrp="1"/>
           </p:cNvSpPr>
@@ -1830,7 +1826,7 @@
       </p:grpSpPr>
       <p:sp>
         <p:nvSpPr>
-          <p:cNvPr id="203" name="Shape 203"/>
+          <p:cNvPr id="207" name="Shape 207"/>
           <p:cNvSpPr>
             <a:spLocks noGrp="1" noRot="1" noChangeAspect="1"/>
           </p:cNvSpPr>
@@ -1857,7 +1853,7 @@
       </p:sp>
       <p:sp>
         <p:nvSpPr>
-          <p:cNvPr id="204" name="Shape 204"/>
+          <p:cNvPr id="208" name="Shape 208"/>
           <p:cNvSpPr>
             <a:spLocks noGrp="1"/>
           </p:cNvSpPr>
@@ -1917,7 +1913,7 @@
       </p:grpSpPr>
       <p:sp>
         <p:nvSpPr>
-          <p:cNvPr id="211" name="Shape 211"/>
+          <p:cNvPr id="215" name="Shape 215"/>
           <p:cNvSpPr>
             <a:spLocks noGrp="1" noRot="1" noChangeAspect="1"/>
           </p:cNvSpPr>
@@ -1944,7 +1940,7 @@
       </p:sp>
       <p:sp>
         <p:nvSpPr>
-          <p:cNvPr id="212" name="Shape 212"/>
+          <p:cNvPr id="216" name="Shape 216"/>
           <p:cNvSpPr>
             <a:spLocks noGrp="1"/>
           </p:cNvSpPr>
@@ -2009,7 +2005,7 @@
       </p:grpSpPr>
       <p:sp>
         <p:nvSpPr>
-          <p:cNvPr id="220" name="Shape 220"/>
+          <p:cNvPr id="224" name="Shape 224"/>
           <p:cNvSpPr>
             <a:spLocks noGrp="1" noRot="1" noChangeAspect="1"/>
           </p:cNvSpPr>
@@ -2032,7 +2028,7 @@
       </p:sp>
       <p:sp>
         <p:nvSpPr>
-          <p:cNvPr id="221" name="Shape 221"/>
+          <p:cNvPr id="225" name="Shape 225"/>
           <p:cNvSpPr>
             <a:spLocks noGrp="1"/>
           </p:cNvSpPr>
@@ -2092,7 +2088,7 @@
       </p:grpSpPr>
       <p:sp>
         <p:nvSpPr>
-          <p:cNvPr id="342" name="Shape 342"/>
+          <p:cNvPr id="346" name="Shape 346"/>
           <p:cNvSpPr>
             <a:spLocks noGrp="1" noRot="1" noChangeAspect="1"/>
           </p:cNvSpPr>
@@ -2115,7 +2111,7 @@
       </p:sp>
       <p:sp>
         <p:nvSpPr>
-          <p:cNvPr id="343" name="Shape 343"/>
+          <p:cNvPr id="347" name="Shape 347"/>
           <p:cNvSpPr>
             <a:spLocks noGrp="1"/>
           </p:cNvSpPr>
@@ -2165,7 +2161,7 @@
       </p:grpSpPr>
       <p:sp>
         <p:nvSpPr>
-          <p:cNvPr id="350" name="Shape 350"/>
+          <p:cNvPr id="354" name="Shape 354"/>
           <p:cNvSpPr>
             <a:spLocks noGrp="1" noRot="1" noChangeAspect="1"/>
           </p:cNvSpPr>
@@ -2188,7 +2184,7 @@
       </p:sp>
       <p:sp>
         <p:nvSpPr>
-          <p:cNvPr id="351" name="Shape 351"/>
+          <p:cNvPr id="355" name="Shape 355"/>
           <p:cNvSpPr>
             <a:spLocks noGrp="1"/>
           </p:cNvSpPr>
@@ -2238,7 +2234,7 @@
       </p:grpSpPr>
       <p:sp>
         <p:nvSpPr>
-          <p:cNvPr id="402" name="Shape 402"/>
+          <p:cNvPr id="406" name="Shape 406"/>
           <p:cNvSpPr>
             <a:spLocks noGrp="1" noRot="1" noChangeAspect="1"/>
           </p:cNvSpPr>
@@ -2261,7 +2257,7 @@
       </p:sp>
       <p:sp>
         <p:nvSpPr>
-          <p:cNvPr id="403" name="Shape 403"/>
+          <p:cNvPr id="407" name="Shape 407"/>
           <p:cNvSpPr>
             <a:spLocks noGrp="1"/>
           </p:cNvSpPr>
@@ -2321,7 +2317,7 @@
       </p:grpSpPr>
       <p:sp>
         <p:nvSpPr>
-          <p:cNvPr id="421" name="Shape 421"/>
+          <p:cNvPr id="425" name="Shape 425"/>
           <p:cNvSpPr>
             <a:spLocks noGrp="1" noRot="1" noChangeAspect="1"/>
           </p:cNvSpPr>
@@ -2344,7 +2340,7 @@
       </p:sp>
       <p:sp>
         <p:nvSpPr>
-          <p:cNvPr id="422" name="Shape 422"/>
+          <p:cNvPr id="426" name="Shape 426"/>
           <p:cNvSpPr>
             <a:spLocks noGrp="1"/>
           </p:cNvSpPr>
@@ -6828,8 +6824,8 @@
         </p:nvSpPr>
         <p:spPr>
           <a:xfrm>
-            <a:off x="4501212" y="9157585"/>
-            <a:ext cx="16135203" cy="1612901"/>
+            <a:off x="4258602" y="9112908"/>
+            <a:ext cx="16620423" cy="1612901"/>
           </a:xfrm>
           <a:prstGeom prst="rect">
             <a:avLst/>
@@ -6872,8 +6868,8 @@
         </p:nvSpPr>
         <p:spPr>
           <a:xfrm>
-            <a:off x="4745718" y="1856938"/>
-            <a:ext cx="14892564" cy="1041401"/>
+            <a:off x="4609590" y="1856938"/>
+            <a:ext cx="15164821" cy="1041401"/>
           </a:xfrm>
           <a:prstGeom prst="rect">
             <a:avLst/>
@@ -6978,8 +6974,8 @@
         </p:nvSpPr>
         <p:spPr>
           <a:xfrm>
-            <a:off x="9867535" y="10701815"/>
-            <a:ext cx="4648930" cy="812801"/>
+            <a:off x="9652000" y="10656041"/>
+            <a:ext cx="5080000" cy="812801"/>
           </a:xfrm>
           <a:prstGeom prst="rect">
             <a:avLst/>
@@ -6998,7 +6994,7 @@
             <a:spAutoFit/>
           </a:bodyPr>
           <a:lstStyle>
-            <a:lvl1pPr algn="l" defTabSz="914400">
+            <a:lvl1pPr defTabSz="914400">
               <a:defRPr sz="5100">
                 <a:latin typeface="Dosis Regular Bold"/>
                 <a:ea typeface="Dosis Regular Bold"/>
@@ -7100,7 +7096,7 @@
       </p:grpSpPr>
       <p:sp>
         <p:nvSpPr>
-          <p:cNvPr id="298" name="SCA USE-CASES"/>
+          <p:cNvPr id="302" name="SCA USE-CASES"/>
           <p:cNvSpPr txBox="1">
             <a:spLocks noGrp="1"/>
           </p:cNvSpPr>
@@ -7144,7 +7140,7 @@
       </p:sp>
       <p:sp>
         <p:nvSpPr>
-          <p:cNvPr id="299" name="Slide Number"/>
+          <p:cNvPr id="303" name="Slide Number"/>
           <p:cNvSpPr txBox="1">
             <a:spLocks noGrp="1"/>
           </p:cNvSpPr>
@@ -7191,7 +7187,7 @@
       </p:sp>
       <p:sp>
         <p:nvSpPr>
-          <p:cNvPr id="300" name="Identify open source components…"/>
+          <p:cNvPr id="304" name="Identify open source components…"/>
           <p:cNvSpPr txBox="1">
             <a:spLocks noGrp="1"/>
           </p:cNvSpPr>
@@ -7327,7 +7323,7 @@
       </p:sp>
       <p:sp>
         <p:nvSpPr>
-          <p:cNvPr id="301" name="South Florida Developer Conference  (SoFlo Dev Con 2024)        Saturday, May 4, 2024"/>
+          <p:cNvPr id="305" name="South Florida Developer Conference  (SoFlo Dev Con 2024)        Saturday, May 4, 2024"/>
           <p:cNvSpPr txBox="1"/>
           <p:nvPr/>
         </p:nvSpPr>
@@ -7427,7 +7423,7 @@
                                       <p:cBhvr>
                                         <p:cTn id="6" fill="hold"/>
                                         <p:tgtEl>
-                                          <p:spTgt spid="300">
+                                          <p:spTgt spid="304">
                                             <p:bg/>
                                           </p:spTgt>
                                         </p:tgtEl>
@@ -7455,7 +7451,7 @@
                                       <p:cBhvr>
                                         <p:cTn id="8" fill="hold"/>
                                         <p:tgtEl>
-                                          <p:spTgt spid="300">
+                                          <p:spTgt spid="304">
                                             <p:txEl>
                                               <p:pRg st="0" end="0"/>
                                             </p:txEl>
@@ -7503,7 +7499,7 @@
                                       <p:cBhvr>
                                         <p:cTn id="12" fill="hold"/>
                                         <p:tgtEl>
-                                          <p:spTgt spid="300">
+                                          <p:spTgt spid="304">
                                             <p:txEl>
                                               <p:pRg st="1" end="1"/>
                                             </p:txEl>
@@ -7551,7 +7547,7 @@
                                       <p:cBhvr>
                                         <p:cTn id="16" fill="hold"/>
                                         <p:tgtEl>
-                                          <p:spTgt spid="300">
+                                          <p:spTgt spid="304">
                                             <p:txEl>
                                               <p:pRg st="2" end="2"/>
                                             </p:txEl>
@@ -7599,7 +7595,7 @@
                                       <p:cBhvr>
                                         <p:cTn id="20" fill="hold"/>
                                         <p:tgtEl>
-                                          <p:spTgt spid="300">
+                                          <p:spTgt spid="304">
                                             <p:txEl>
                                               <p:pRg st="3" end="3"/>
                                             </p:txEl>
@@ -7647,7 +7643,7 @@
                                       <p:cBhvr>
                                         <p:cTn id="24" fill="hold"/>
                                         <p:tgtEl>
-                                          <p:spTgt spid="300">
+                                          <p:spTgt spid="304">
                                             <p:txEl>
                                               <p:pRg st="4" end="4"/>
                                             </p:txEl>
@@ -7695,7 +7691,7 @@
                                       <p:cBhvr>
                                         <p:cTn id="28" fill="hold"/>
                                         <p:tgtEl>
-                                          <p:spTgt spid="300">
+                                          <p:spTgt spid="304">
                                             <p:txEl>
                                               <p:pRg st="5" end="5"/>
                                             </p:txEl>
@@ -7743,7 +7739,7 @@
                                       <p:cBhvr>
                                         <p:cTn id="32" fill="hold"/>
                                         <p:tgtEl>
-                                          <p:spTgt spid="300">
+                                          <p:spTgt spid="304">
                                             <p:txEl>
                                               <p:pRg st="6" end="6"/>
                                             </p:txEl>
@@ -7788,7 +7784,7 @@
       </p:par>
     </p:tnLst>
     <p:bldLst>
-      <p:bldP spid="300" grpId="1" build="p" bldLvl="5" animBg="1" advAuto="0"/>
+      <p:bldP spid="304" grpId="1" build="p" bldLvl="5" animBg="1" advAuto="0"/>
     </p:bldLst>
   </p:timing>
 </p:sld>
@@ -7813,7 +7809,7 @@
       </p:grpSpPr>
       <p:pic>
         <p:nvPicPr>
-          <p:cNvPr id="303" name="Star-Field-Explosion-smaller-20.jpg" descr="Star-Field-Explosion-smaller-20.jpg"/>
+          <p:cNvPr id="307" name="Star-Field-Explosion-smaller-20.jpg" descr="Star-Field-Explosion-smaller-20.jpg"/>
           <p:cNvPicPr>
             <a:picLocks noChangeAspect="1"/>
           </p:cNvPicPr>
@@ -7842,7 +7838,7 @@
       </p:pic>
       <p:sp>
         <p:nvSpPr>
-          <p:cNvPr id="304" name="Software COmposition Analysis…"/>
+          <p:cNvPr id="308" name="Software COmposition Analysis…"/>
           <p:cNvSpPr txBox="1">
             <a:spLocks noGrp="1"/>
           </p:cNvSpPr>
@@ -7923,7 +7919,7 @@
       </p:sp>
       <p:sp>
         <p:nvSpPr>
-          <p:cNvPr id="305" name="Slide Number"/>
+          <p:cNvPr id="309" name="Slide Number"/>
           <p:cNvSpPr txBox="1">
             <a:spLocks noGrp="1"/>
           </p:cNvSpPr>
@@ -7970,7 +7966,7 @@
       </p:sp>
       <p:sp>
         <p:nvSpPr>
-          <p:cNvPr id="306" name="Some SCA tools use SAST to  confirm that code is vulnerable…"/>
+          <p:cNvPr id="310" name="Some SCA tools use SAST to  confirm that code is vulnerable…"/>
           <p:cNvSpPr txBox="1">
             <a:spLocks noGrp="1"/>
           </p:cNvSpPr>
@@ -8042,7 +8038,7 @@
       </p:sp>
       <p:sp>
         <p:nvSpPr>
-          <p:cNvPr id="307" name="South Florida Developer Conference  (SoFlo Dev Con 2024)        Saturday, May 4, 2024"/>
+          <p:cNvPr id="311" name="South Florida Developer Conference  (SoFlo Dev Con 2024)        Saturday, May 4, 2024"/>
           <p:cNvSpPr txBox="1"/>
           <p:nvPr/>
         </p:nvSpPr>
@@ -8142,7 +8138,7 @@
                                       <p:cBhvr>
                                         <p:cTn id="6" fill="hold"/>
                                         <p:tgtEl>
-                                          <p:spTgt spid="306">
+                                          <p:spTgt spid="310">
                                             <p:bg/>
                                           </p:spTgt>
                                         </p:tgtEl>
@@ -8170,7 +8166,7 @@
                                       <p:cBhvr>
                                         <p:cTn id="8" fill="hold"/>
                                         <p:tgtEl>
-                                          <p:spTgt spid="306">
+                                          <p:spTgt spid="310">
                                             <p:txEl>
                                               <p:pRg st="0" end="0"/>
                                             </p:txEl>
@@ -8218,7 +8214,7 @@
                                       <p:cBhvr>
                                         <p:cTn id="12" fill="hold"/>
                                         <p:tgtEl>
-                                          <p:spTgt spid="306">
+                                          <p:spTgt spid="310">
                                             <p:txEl>
                                               <p:pRg st="1" end="1"/>
                                             </p:txEl>
@@ -8266,7 +8262,7 @@
                                       <p:cBhvr>
                                         <p:cTn id="16" fill="hold"/>
                                         <p:tgtEl>
-                                          <p:spTgt spid="306">
+                                          <p:spTgt spid="310">
                                             <p:txEl>
                                               <p:pRg st="2" end="2"/>
                                             </p:txEl>
@@ -8311,7 +8307,7 @@
       </p:par>
     </p:tnLst>
     <p:bldLst>
-      <p:bldP spid="306" grpId="1" build="p" bldLvl="5" animBg="1" advAuto="0"/>
+      <p:bldP spid="310" grpId="1" build="p" bldLvl="5" animBg="1" advAuto="0"/>
     </p:bldLst>
   </p:timing>
 </p:sld>
@@ -8336,7 +8332,7 @@
       </p:grpSpPr>
       <p:sp>
         <p:nvSpPr>
-          <p:cNvPr id="309" name="JUST a Simple UpdatE?"/>
+          <p:cNvPr id="313" name="JUST a Simple UpdatE?"/>
           <p:cNvSpPr txBox="1">
             <a:spLocks noGrp="1"/>
           </p:cNvSpPr>
@@ -8380,7 +8376,7 @@
       </p:sp>
       <p:sp>
         <p:nvSpPr>
-          <p:cNvPr id="310" name="Slide Number"/>
+          <p:cNvPr id="314" name="Slide Number"/>
           <p:cNvSpPr txBox="1">
             <a:spLocks noGrp="1"/>
           </p:cNvSpPr>
@@ -8427,7 +8423,7 @@
       </p:sp>
       <p:sp>
         <p:nvSpPr>
-          <p:cNvPr id="311" name="H2 database…"/>
+          <p:cNvPr id="315" name="H2 database…"/>
           <p:cNvSpPr txBox="1">
             <a:spLocks noGrp="1"/>
           </p:cNvSpPr>
@@ -8546,7 +8542,7 @@
       </p:sp>
       <p:sp>
         <p:nvSpPr>
-          <p:cNvPr id="312" name="South Florida Developer Conference  (SoFlo Dev Con 2024)        Saturday, May 4, 2024"/>
+          <p:cNvPr id="316" name="South Florida Developer Conference  (SoFlo Dev Con 2024)        Saturday, May 4, 2024"/>
           <p:cNvSpPr txBox="1"/>
           <p:nvPr/>
         </p:nvSpPr>
@@ -8598,7 +8594,7 @@
       </p:sp>
       <p:pic>
         <p:nvPicPr>
-          <p:cNvPr id="313" name="Yoda-small copy 2.png" descr="Yoda-small copy 2.png"/>
+          <p:cNvPr id="317" name="Yoda-small copy 2.png" descr="Yoda-small copy 2.png"/>
           <p:cNvPicPr>
             <a:picLocks noChangeAspect="1"/>
           </p:cNvPicPr>
@@ -8627,7 +8623,7 @@
       </p:pic>
       <p:sp>
         <p:nvSpPr>
-          <p:cNvPr id="314" name="MAYBE or MAYBE NOT"/>
+          <p:cNvPr id="318" name="MAYBE or MAYBE NOT"/>
           <p:cNvSpPr txBox="1"/>
           <p:nvPr/>
         </p:nvSpPr>
@@ -8725,7 +8721,7 @@
                                       <p:cBhvr>
                                         <p:cTn id="6" fill="hold"/>
                                         <p:tgtEl>
-                                          <p:spTgt spid="311">
+                                          <p:spTgt spid="315">
                                             <p:bg/>
                                           </p:spTgt>
                                         </p:tgtEl>
@@ -8753,7 +8749,7 @@
                                       <p:cBhvr>
                                         <p:cTn id="8" fill="hold"/>
                                         <p:tgtEl>
-                                          <p:spTgt spid="311">
+                                          <p:spTgt spid="315">
                                             <p:txEl>
                                               <p:pRg st="0" end="0"/>
                                             </p:txEl>
@@ -8801,7 +8797,7 @@
                                       <p:cBhvr>
                                         <p:cTn id="12" fill="hold"/>
                                         <p:tgtEl>
-                                          <p:spTgt spid="311">
+                                          <p:spTgt spid="315">
                                             <p:txEl>
                                               <p:pRg st="1" end="1"/>
                                             </p:txEl>
@@ -8849,7 +8845,7 @@
                                       <p:cBhvr>
                                         <p:cTn id="16" fill="hold"/>
                                         <p:tgtEl>
-                                          <p:spTgt spid="311">
+                                          <p:spTgt spid="315">
                                             <p:txEl>
                                               <p:pRg st="2" end="2"/>
                                             </p:txEl>
@@ -8897,7 +8893,7 @@
                                       <p:cBhvr>
                                         <p:cTn id="20" fill="hold"/>
                                         <p:tgtEl>
-                                          <p:spTgt spid="311">
+                                          <p:spTgt spid="315">
                                             <p:txEl>
                                               <p:pRg st="3" end="3"/>
                                             </p:txEl>
@@ -8945,7 +8941,7 @@
                                       <p:cBhvr>
                                         <p:cTn id="24" fill="hold"/>
                                         <p:tgtEl>
-                                          <p:spTgt spid="311">
+                                          <p:spTgt spid="315">
                                             <p:txEl>
                                               <p:pRg st="4" end="4"/>
                                             </p:txEl>
@@ -8990,7 +8986,7 @@
       </p:par>
     </p:tnLst>
     <p:bldLst>
-      <p:bldP spid="311" grpId="1" build="p" bldLvl="5" animBg="1" advAuto="0"/>
+      <p:bldP spid="315" grpId="1" build="p" bldLvl="5" animBg="1" advAuto="0"/>
     </p:bldLst>
   </p:timing>
 </p:sld>
@@ -9015,7 +9011,7 @@
       </p:grpSpPr>
       <p:sp>
         <p:nvSpPr>
-          <p:cNvPr id="316" name="CVE…"/>
+          <p:cNvPr id="320" name="CVE…"/>
           <p:cNvSpPr txBox="1">
             <a:spLocks noGrp="1"/>
           </p:cNvSpPr>
@@ -9077,7 +9073,7 @@
       </p:sp>
       <p:sp>
         <p:nvSpPr>
-          <p:cNvPr id="317" name="Slide Number"/>
+          <p:cNvPr id="321" name="Slide Number"/>
           <p:cNvSpPr txBox="1">
             <a:spLocks noGrp="1"/>
           </p:cNvSpPr>
@@ -9124,7 +9120,7 @@
       </p:sp>
       <p:sp>
         <p:nvSpPr>
-          <p:cNvPr id="318" name="Publicly released list of known cybersecurity vulnerabilities…"/>
+          <p:cNvPr id="322" name="Publicly released list of known cybersecurity vulnerabilities…"/>
           <p:cNvSpPr txBox="1">
             <a:spLocks noGrp="1"/>
           </p:cNvSpPr>
@@ -9244,7 +9240,7 @@
       </p:sp>
       <p:sp>
         <p:nvSpPr>
-          <p:cNvPr id="319" name="South Florida Developer Conference  (SoFlo Dev Con 2024)        Saturday, May 4, 2024"/>
+          <p:cNvPr id="323" name="South Florida Developer Conference  (SoFlo Dev Con 2024)        Saturday, May 4, 2024"/>
           <p:cNvSpPr txBox="1"/>
           <p:nvPr/>
         </p:nvSpPr>
@@ -9296,7 +9292,7 @@
       </p:sp>
       <p:sp>
         <p:nvSpPr>
-          <p:cNvPr id="320" name="Source:  https://www.cve.org/"/>
+          <p:cNvPr id="324" name="Source:  https://www.cve.org/"/>
           <p:cNvSpPr txBox="1"/>
           <p:nvPr/>
         </p:nvSpPr>
@@ -9402,7 +9398,7 @@
                                       <p:cBhvr>
                                         <p:cTn id="6" fill="hold"/>
                                         <p:tgtEl>
-                                          <p:spTgt spid="318">
+                                          <p:spTgt spid="322">
                                             <p:bg/>
                                           </p:spTgt>
                                         </p:tgtEl>
@@ -9430,7 +9426,7 @@
                                       <p:cBhvr>
                                         <p:cTn id="8" fill="hold"/>
                                         <p:tgtEl>
-                                          <p:spTgt spid="318">
+                                          <p:spTgt spid="322">
                                             <p:txEl>
                                               <p:pRg st="0" end="0"/>
                                             </p:txEl>
@@ -9478,7 +9474,7 @@
                                       <p:cBhvr>
                                         <p:cTn id="12" fill="hold"/>
                                         <p:tgtEl>
-                                          <p:spTgt spid="318">
+                                          <p:spTgt spid="322">
                                             <p:txEl>
                                               <p:pRg st="1" end="1"/>
                                             </p:txEl>
@@ -9526,7 +9522,7 @@
                                       <p:cBhvr>
                                         <p:cTn id="16" fill="hold"/>
                                         <p:tgtEl>
-                                          <p:spTgt spid="318">
+                                          <p:spTgt spid="322">
                                             <p:txEl>
                                               <p:pRg st="2" end="2"/>
                                             </p:txEl>
@@ -9574,7 +9570,7 @@
                                       <p:cBhvr>
                                         <p:cTn id="20" fill="hold"/>
                                         <p:tgtEl>
-                                          <p:spTgt spid="318">
+                                          <p:spTgt spid="322">
                                             <p:txEl>
                                               <p:pRg st="3" end="3"/>
                                             </p:txEl>
@@ -9622,7 +9618,7 @@
                                       <p:cBhvr>
                                         <p:cTn id="24" fill="hold"/>
                                         <p:tgtEl>
-                                          <p:spTgt spid="318">
+                                          <p:spTgt spid="322">
                                             <p:txEl>
                                               <p:pRg st="4" end="4"/>
                                             </p:txEl>
@@ -9670,7 +9666,7 @@
                                       <p:cBhvr>
                                         <p:cTn id="28" fill="hold"/>
                                         <p:tgtEl>
-                                          <p:spTgt spid="318">
+                                          <p:spTgt spid="322">
                                             <p:txEl>
                                               <p:pRg st="5" end="5"/>
                                             </p:txEl>
@@ -9718,7 +9714,7 @@
                                       <p:cBhvr>
                                         <p:cTn id="32" fill="hold"/>
                                         <p:tgtEl>
-                                          <p:spTgt spid="320"/>
+                                          <p:spTgt spid="324"/>
                                         </p:tgtEl>
                                         <p:attrNameLst>
                                           <p:attrName>style.visibility</p:attrName>
@@ -9759,8 +9755,8 @@
       </p:par>
     </p:tnLst>
     <p:bldLst>
-      <p:bldP spid="318" grpId="1" build="p" bldLvl="5" animBg="1" advAuto="0"/>
-      <p:bldP spid="320" grpId="2" animBg="1" advAuto="0"/>
+      <p:bldP spid="322" grpId="1" build="p" bldLvl="5" animBg="1" advAuto="0"/>
+      <p:bldP spid="324" grpId="2" animBg="1" advAuto="0"/>
     </p:bldLst>
   </p:timing>
 </p:sld>
@@ -9785,7 +9781,7 @@
       </p:grpSpPr>
       <p:sp>
         <p:nvSpPr>
-          <p:cNvPr id="322" name="SBOM Formats…"/>
+          <p:cNvPr id="326" name="SBOM Formats…"/>
           <p:cNvSpPr txBox="1">
             <a:spLocks noGrp="1"/>
           </p:cNvSpPr>
@@ -9847,7 +9843,7 @@
       </p:sp>
       <p:sp>
         <p:nvSpPr>
-          <p:cNvPr id="323" name="Slide Number"/>
+          <p:cNvPr id="327" name="Slide Number"/>
           <p:cNvSpPr txBox="1">
             <a:spLocks noGrp="1"/>
           </p:cNvSpPr>
@@ -9894,7 +9890,7 @@
       </p:sp>
       <p:sp>
         <p:nvSpPr>
-          <p:cNvPr id="324" name="CycloneDX…"/>
+          <p:cNvPr id="328" name="CycloneDX…"/>
           <p:cNvSpPr txBox="1">
             <a:spLocks noGrp="1"/>
           </p:cNvSpPr>
@@ -9952,7 +9948,7 @@
       </p:sp>
       <p:sp>
         <p:nvSpPr>
-          <p:cNvPr id="325" name="South Florida Developer Conference  (SoFlo Dev Con 2024)        Saturday, May 4, 2024"/>
+          <p:cNvPr id="329" name="South Florida Developer Conference  (SoFlo Dev Con 2024)        Saturday, May 4, 2024"/>
           <p:cNvSpPr txBox="1"/>
           <p:nvPr/>
         </p:nvSpPr>
@@ -10004,7 +10000,7 @@
       </p:sp>
       <p:sp>
         <p:nvSpPr>
-          <p:cNvPr id="326" name="SPDX® (Software Package Data Exchange)…"/>
+          <p:cNvPr id="330" name="SPDX® (Software Package Data Exchange)…"/>
           <p:cNvSpPr txBox="1"/>
           <p:nvPr/>
         </p:nvSpPr>
@@ -10078,7 +10074,7 @@
       </p:sp>
       <p:grpSp>
         <p:nvGrpSpPr>
-          <p:cNvPr id="329" name="Group"/>
+          <p:cNvPr id="333" name="Group"/>
           <p:cNvGrpSpPr/>
           <p:nvPr/>
         </p:nvGrpSpPr>
@@ -10092,7 +10088,7 @@
         </p:grpSpPr>
         <p:sp>
           <p:nvSpPr>
-            <p:cNvPr id="327" name="Source:  https://cyclonedx.org/"/>
+            <p:cNvPr id="331" name="Source:  https://cyclonedx.org/"/>
             <p:cNvSpPr txBox="1"/>
             <p:nvPr/>
           </p:nvSpPr>
@@ -10153,7 +10149,7 @@
         </p:sp>
         <p:sp>
           <p:nvSpPr>
-            <p:cNvPr id="328" name="Source:  https://spdx.dev/"/>
+            <p:cNvPr id="332" name="Source:  https://spdx.dev/"/>
             <p:cNvSpPr txBox="1"/>
             <p:nvPr/>
           </p:nvSpPr>
@@ -10263,7 +10259,7 @@
                                       <p:cBhvr>
                                         <p:cTn id="6" fill="hold"/>
                                         <p:tgtEl>
-                                          <p:spTgt spid="324"/>
+                                          <p:spTgt spid="328"/>
                                         </p:tgtEl>
                                         <p:attrNameLst>
                                           <p:attrName>style.visibility</p:attrName>
@@ -10307,7 +10303,7 @@
                                       <p:cBhvr>
                                         <p:cTn id="10" fill="hold"/>
                                         <p:tgtEl>
-                                          <p:spTgt spid="326"/>
+                                          <p:spTgt spid="330"/>
                                         </p:tgtEl>
                                         <p:attrNameLst>
                                           <p:attrName>style.visibility</p:attrName>
@@ -10351,7 +10347,7 @@
                                       <p:cBhvr>
                                         <p:cTn id="14" fill="hold"/>
                                         <p:tgtEl>
-                                          <p:spTgt spid="329"/>
+                                          <p:spTgt spid="333"/>
                                         </p:tgtEl>
                                         <p:attrNameLst>
                                           <p:attrName>style.visibility</p:attrName>
@@ -10392,9 +10388,9 @@
       </p:par>
     </p:tnLst>
     <p:bldLst>
-      <p:bldP spid="324" grpId="1" animBg="1" advAuto="0"/>
-      <p:bldP spid="326" grpId="2" animBg="1" advAuto="0"/>
-      <p:bldP spid="329" grpId="3" animBg="1" advAuto="0"/>
+      <p:bldP spid="328" grpId="1" animBg="1" advAuto="0"/>
+      <p:bldP spid="330" grpId="2" animBg="1" advAuto="0"/>
+      <p:bldP spid="333" grpId="3" animBg="1" advAuto="0"/>
     </p:bldLst>
   </p:timing>
 </p:sld>
@@ -10419,7 +10415,7 @@
       </p:grpSpPr>
       <p:sp>
         <p:nvSpPr>
-          <p:cNvPr id="331" name="Example SBOM?"/>
+          <p:cNvPr id="335" name="Example SBOM?"/>
           <p:cNvSpPr txBox="1">
             <a:spLocks noGrp="1"/>
           </p:cNvSpPr>
@@ -10463,7 +10459,7 @@
       </p:sp>
       <p:sp>
         <p:nvSpPr>
-          <p:cNvPr id="332" name="Slide Number"/>
+          <p:cNvPr id="336" name="Slide Number"/>
           <p:cNvSpPr txBox="1">
             <a:spLocks noGrp="1"/>
           </p:cNvSpPr>
@@ -10510,7 +10506,7 @@
       </p:sp>
       <p:sp>
         <p:nvSpPr>
-          <p:cNvPr id="333" name="Source: https://www.thesslstore.com/blog/sbom-an-up-close-look-at-a-software-bill-of-materials/"/>
+          <p:cNvPr id="337" name="Source: https://www.thesslstore.com/blog/sbom-an-up-close-look-at-a-software-bill-of-materials/"/>
           <p:cNvSpPr txBox="1"/>
           <p:nvPr/>
         </p:nvSpPr>
@@ -10568,7 +10564,7 @@
       </p:sp>
       <p:pic>
         <p:nvPicPr>
-          <p:cNvPr id="334" name="ntia-sbom-example-shadow-smaller-30.jpg" descr="ntia-sbom-example-shadow-smaller-30.jpg"/>
+          <p:cNvPr id="338" name="ntia-sbom-example-shadow-smaller-30.jpg" descr="ntia-sbom-example-shadow-smaller-30.jpg"/>
           <p:cNvPicPr>
             <a:picLocks noChangeAspect="1"/>
           </p:cNvPicPr>
@@ -10597,7 +10593,7 @@
       </p:pic>
       <p:sp>
         <p:nvSpPr>
-          <p:cNvPr id="335" name="South Florida Developer Conference  (SoFlo Dev Con 2024)        Saturday, May 4, 2024"/>
+          <p:cNvPr id="339" name="South Florida Developer Conference  (SoFlo Dev Con 2024)        Saturday, May 4, 2024"/>
           <p:cNvSpPr txBox="1"/>
           <p:nvPr/>
         </p:nvSpPr>
@@ -10686,7 +10682,7 @@
       </p:grpSpPr>
       <p:sp>
         <p:nvSpPr>
-          <p:cNvPr id="337" name="SBOM USAGE…"/>
+          <p:cNvPr id="341" name="SBOM USAGE…"/>
           <p:cNvSpPr txBox="1">
             <a:spLocks noGrp="1"/>
           </p:cNvSpPr>
@@ -10748,7 +10744,7 @@
       </p:sp>
       <p:sp>
         <p:nvSpPr>
-          <p:cNvPr id="338" name="Slide Number"/>
+          <p:cNvPr id="342" name="Slide Number"/>
           <p:cNvSpPr txBox="1">
             <a:spLocks noGrp="1"/>
           </p:cNvSpPr>
@@ -10795,7 +10791,7 @@
       </p:sp>
       <p:sp>
         <p:nvSpPr>
-          <p:cNvPr id="339" name="Source: Sonatype 9th Annual State of the Software Supply Chain Report, Nov 2023"/>
+          <p:cNvPr id="343" name="Source: Sonatype 9th Annual State of the Software Supply Chain Report, Nov 2023"/>
           <p:cNvSpPr txBox="1"/>
           <p:nvPr/>
         </p:nvSpPr>
@@ -10853,7 +10849,7 @@
       </p:sp>
       <p:pic>
         <p:nvPicPr>
-          <p:cNvPr id="340" name="SBOM-Survey-606x350.png" descr="SBOM-Survey-606x350.png"/>
+          <p:cNvPr id="344" name="SBOM-Survey-606x350.png" descr="SBOM-Survey-606x350.png"/>
           <p:cNvPicPr>
             <a:picLocks noChangeAspect="1"/>
           </p:cNvPicPr>
@@ -10882,7 +10878,7 @@
       </p:pic>
       <p:sp>
         <p:nvSpPr>
-          <p:cNvPr id="341" name="South Florida Developer Conference  (SoFlo Dev Con 2024)        Saturday, May 4, 2024"/>
+          <p:cNvPr id="345" name="South Florida Developer Conference  (SoFlo Dev Con 2024)        Saturday, May 4, 2024"/>
           <p:cNvSpPr txBox="1"/>
           <p:nvPr/>
         </p:nvSpPr>
@@ -10971,7 +10967,7 @@
       </p:grpSpPr>
       <p:sp>
         <p:nvSpPr>
-          <p:cNvPr id="345" name="SBOM Adoption DRIVERs"/>
+          <p:cNvPr id="349" name="SBOM Adoption DRIVERs"/>
           <p:cNvSpPr txBox="1">
             <a:spLocks noGrp="1"/>
           </p:cNvSpPr>
@@ -11015,7 +11011,7 @@
       </p:sp>
       <p:sp>
         <p:nvSpPr>
-          <p:cNvPr id="346" name="Slide Number"/>
+          <p:cNvPr id="350" name="Slide Number"/>
           <p:cNvSpPr txBox="1">
             <a:spLocks noGrp="1"/>
           </p:cNvSpPr>
@@ -11062,7 +11058,7 @@
       </p:sp>
       <p:sp>
         <p:nvSpPr>
-          <p:cNvPr id="347" name="Source: https://www.whitehouse.gov/briefing-room/presidential-actions/2021/05/12/executive-order-on-improving-the-nations-cybersecurity/"/>
+          <p:cNvPr id="351" name="Source: https://www.whitehouse.gov/briefing-room/presidential-actions/2021/05/12/executive-order-on-improving-the-nations-cybersecurity/"/>
           <p:cNvSpPr txBox="1"/>
           <p:nvPr/>
         </p:nvSpPr>
@@ -11120,7 +11116,7 @@
       </p:sp>
       <p:sp>
         <p:nvSpPr>
-          <p:cNvPr id="348" name="South Florida Developer Conference  (SoFlo Dev Con 2024)        Saturday, May 4, 2024"/>
+          <p:cNvPr id="352" name="South Florida Developer Conference  (SoFlo Dev Con 2024)        Saturday, May 4, 2024"/>
           <p:cNvSpPr txBox="1"/>
           <p:nvPr/>
         </p:nvSpPr>
@@ -11172,7 +11168,7 @@
       </p:sp>
       <p:sp>
         <p:nvSpPr>
-          <p:cNvPr id="349" name="Presidential Executive order 14028 (Cybersecurity)…"/>
+          <p:cNvPr id="353" name="Presidential Executive order 14028 (Cybersecurity)…"/>
           <p:cNvSpPr txBox="1">
             <a:spLocks noGrp="1"/>
           </p:cNvSpPr>
@@ -11324,7 +11320,7 @@
                                       <p:cBhvr>
                                         <p:cTn id="6" fill="hold"/>
                                         <p:tgtEl>
-                                          <p:spTgt spid="349">
+                                          <p:spTgt spid="353">
                                             <p:bg/>
                                           </p:spTgt>
                                         </p:tgtEl>
@@ -11352,7 +11348,7 @@
                                       <p:cBhvr>
                                         <p:cTn id="8" fill="hold"/>
                                         <p:tgtEl>
-                                          <p:spTgt spid="349">
+                                          <p:spTgt spid="353">
                                             <p:txEl>
                                               <p:pRg st="0" end="0"/>
                                             </p:txEl>
@@ -11400,7 +11396,7 @@
                                       <p:cBhvr>
                                         <p:cTn id="12" fill="hold"/>
                                         <p:tgtEl>
-                                          <p:spTgt spid="349">
+                                          <p:spTgt spid="353">
                                             <p:txEl>
                                               <p:pRg st="1" end="1"/>
                                             </p:txEl>
@@ -11448,7 +11444,7 @@
                                       <p:cBhvr>
                                         <p:cTn id="16" fill="hold"/>
                                         <p:tgtEl>
-                                          <p:spTgt spid="349">
+                                          <p:spTgt spid="353">
                                             <p:txEl>
                                               <p:pRg st="2" end="2"/>
                                             </p:txEl>
@@ -11496,7 +11492,7 @@
                                       <p:cBhvr>
                                         <p:cTn id="20" fill="hold"/>
                                         <p:tgtEl>
-                                          <p:spTgt spid="349">
+                                          <p:spTgt spid="353">
                                             <p:txEl>
                                               <p:pRg st="3" end="3"/>
                                             </p:txEl>
@@ -11544,7 +11540,7 @@
                                       <p:cBhvr>
                                         <p:cTn id="24" fill="hold"/>
                                         <p:tgtEl>
-                                          <p:spTgt spid="349">
+                                          <p:spTgt spid="353">
                                             <p:txEl>
                                               <p:pRg st="4" end="4"/>
                                             </p:txEl>
@@ -11589,7 +11585,7 @@
       </p:par>
     </p:tnLst>
     <p:bldLst>
-      <p:bldP spid="349" grpId="1" build="p" bldLvl="5" animBg="1" advAuto="0"/>
+      <p:bldP spid="353" grpId="1" build="p" bldLvl="5" animBg="1" advAuto="0"/>
     </p:bldLst>
   </p:timing>
 </p:sld>
@@ -11614,7 +11610,7 @@
       </p:grpSpPr>
       <p:sp>
         <p:nvSpPr>
-          <p:cNvPr id="353" name="Where is SCA in Build PIPELINE"/>
+          <p:cNvPr id="357" name="Where is SCA in Build PIPELINE"/>
           <p:cNvSpPr txBox="1">
             <a:spLocks noGrp="1"/>
           </p:cNvSpPr>
@@ -11658,7 +11654,7 @@
       </p:sp>
       <p:sp>
         <p:nvSpPr>
-          <p:cNvPr id="354" name="Slide Number"/>
+          <p:cNvPr id="358" name="Slide Number"/>
           <p:cNvSpPr txBox="1">
             <a:spLocks noGrp="1"/>
           </p:cNvSpPr>
@@ -11705,7 +11701,7 @@
       </p:sp>
       <p:sp>
         <p:nvSpPr>
-          <p:cNvPr id="355" name="Source: https://vulcan.io/blog/ci-cd-security-5-best-practices/"/>
+          <p:cNvPr id="359" name="Source: https://vulcan.io/blog/ci-cd-security-5-best-practices/"/>
           <p:cNvSpPr txBox="1"/>
           <p:nvPr/>
         </p:nvSpPr>
@@ -11763,7 +11759,7 @@
       </p:sp>
       <p:sp>
         <p:nvSpPr>
-          <p:cNvPr id="356" name="South Florida Developer Conference  (SoFlo Dev Con 2024)        Saturday, May 4, 2024"/>
+          <p:cNvPr id="360" name="South Florida Developer Conference  (SoFlo Dev Con 2024)        Saturday, May 4, 2024"/>
           <p:cNvSpPr txBox="1"/>
           <p:nvPr/>
         </p:nvSpPr>
@@ -11815,7 +11811,7 @@
       </p:sp>
       <p:grpSp>
         <p:nvGrpSpPr>
-          <p:cNvPr id="393" name="Group"/>
+          <p:cNvPr id="397" name="Group"/>
           <p:cNvGrpSpPr/>
           <p:nvPr/>
         </p:nvGrpSpPr>
@@ -11829,7 +11825,7 @@
         </p:grpSpPr>
         <p:sp>
           <p:nvSpPr>
-            <p:cNvPr id="357" name="Line"/>
+            <p:cNvPr id="361" name="Line"/>
             <p:cNvSpPr/>
             <p:nvPr/>
           </p:nvSpPr>
@@ -11877,7 +11873,7 @@
         </p:sp>
         <p:sp>
           <p:nvSpPr>
-            <p:cNvPr id="358" name="Line"/>
+            <p:cNvPr id="362" name="Line"/>
             <p:cNvSpPr/>
             <p:nvPr/>
           </p:nvSpPr>
@@ -11925,7 +11921,7 @@
         </p:sp>
         <p:sp>
           <p:nvSpPr>
-            <p:cNvPr id="359" name="Line"/>
+            <p:cNvPr id="363" name="Line"/>
             <p:cNvSpPr/>
             <p:nvPr/>
           </p:nvSpPr>
@@ -11973,7 +11969,7 @@
         </p:sp>
         <p:sp>
           <p:nvSpPr>
-            <p:cNvPr id="360" name="Line"/>
+            <p:cNvPr id="364" name="Line"/>
             <p:cNvSpPr/>
             <p:nvPr/>
           </p:nvSpPr>
@@ -12021,7 +12017,7 @@
         </p:sp>
         <p:sp>
           <p:nvSpPr>
-            <p:cNvPr id="361" name="Line"/>
+            <p:cNvPr id="365" name="Line"/>
             <p:cNvSpPr/>
             <p:nvPr/>
           </p:nvSpPr>
@@ -12069,7 +12065,7 @@
         </p:sp>
         <p:sp>
           <p:nvSpPr>
-            <p:cNvPr id="362" name="Line"/>
+            <p:cNvPr id="366" name="Line"/>
             <p:cNvSpPr/>
             <p:nvPr/>
           </p:nvSpPr>
@@ -12117,7 +12113,7 @@
         </p:sp>
         <p:sp>
           <p:nvSpPr>
-            <p:cNvPr id="363" name="Line"/>
+            <p:cNvPr id="367" name="Line"/>
             <p:cNvSpPr/>
             <p:nvPr/>
           </p:nvSpPr>
@@ -12165,7 +12161,7 @@
         </p:sp>
         <p:pic>
           <p:nvPicPr>
-            <p:cNvPr id="364" name="Cogs-in-circle-65x65.png" descr="Cogs-in-circle-65x65.png"/>
+            <p:cNvPr id="368" name="Cogs-in-circle-65x65.png" descr="Cogs-in-circle-65x65.png"/>
             <p:cNvPicPr>
               <a:picLocks noChangeAspect="1"/>
             </p:cNvPicPr>
@@ -12196,7 +12192,7 @@
         </p:pic>
         <p:pic>
           <p:nvPicPr>
-            <p:cNvPr id="365" name="Cogs-with-person-in-circle-65x65.png" descr="Cogs-with-person-in-circle-65x65.png"/>
+            <p:cNvPr id="369" name="Cogs-with-person-in-circle-65x65.png" descr="Cogs-with-person-in-circle-65x65.png"/>
             <p:cNvPicPr>
               <a:picLocks noChangeAspect="1"/>
             </p:cNvPicPr>
@@ -12227,7 +12223,7 @@
         </p:pic>
         <p:pic>
           <p:nvPicPr>
-            <p:cNvPr id="366" name="Cogs-with-person-in-circle-65x65.png" descr="Cogs-with-person-in-circle-65x65.png"/>
+            <p:cNvPr id="370" name="Cogs-with-person-in-circle-65x65.png" descr="Cogs-with-person-in-circle-65x65.png"/>
             <p:cNvPicPr>
               <a:picLocks noChangeAspect="1"/>
             </p:cNvPicPr>
@@ -12258,7 +12254,7 @@
         </p:pic>
         <p:pic>
           <p:nvPicPr>
-            <p:cNvPr id="367" name="Cogs-with-person-in-circle-65x65.png" descr="Cogs-with-person-in-circle-65x65.png"/>
+            <p:cNvPr id="371" name="Cogs-with-person-in-circle-65x65.png" descr="Cogs-with-person-in-circle-65x65.png"/>
             <p:cNvPicPr>
               <a:picLocks noChangeAspect="1"/>
             </p:cNvPicPr>
@@ -12289,7 +12285,7 @@
         </p:pic>
         <p:pic>
           <p:nvPicPr>
-            <p:cNvPr id="368" name="Cogs-with-person-in-circle-65x65.png" descr="Cogs-with-person-in-circle-65x65.png"/>
+            <p:cNvPr id="372" name="Cogs-with-person-in-circle-65x65.png" descr="Cogs-with-person-in-circle-65x65.png"/>
             <p:cNvPicPr>
               <a:picLocks noChangeAspect="1"/>
             </p:cNvPicPr>
@@ -12320,7 +12316,7 @@
         </p:pic>
         <p:pic>
           <p:nvPicPr>
-            <p:cNvPr id="369" name="Cogs-with-person-in-circle-65x65.png" descr="Cogs-with-person-in-circle-65x65.png"/>
+            <p:cNvPr id="373" name="Cogs-with-person-in-circle-65x65.png" descr="Cogs-with-person-in-circle-65x65.png"/>
             <p:cNvPicPr>
               <a:picLocks noChangeAspect="1"/>
             </p:cNvPicPr>
@@ -12351,7 +12347,7 @@
         </p:pic>
         <p:pic>
           <p:nvPicPr>
-            <p:cNvPr id="370" name="Cogs-with-person-in-circle-65x65.png" descr="Cogs-with-person-in-circle-65x65.png"/>
+            <p:cNvPr id="374" name="Cogs-with-person-in-circle-65x65.png" descr="Cogs-with-person-in-circle-65x65.png"/>
             <p:cNvPicPr>
               <a:picLocks noChangeAspect="1"/>
             </p:cNvPicPr>
@@ -12382,7 +12378,7 @@
         </p:pic>
         <p:pic>
           <p:nvPicPr>
-            <p:cNvPr id="371" name="Cogs-with-person-in-circle-65x65.png" descr="Cogs-with-person-in-circle-65x65.png"/>
+            <p:cNvPr id="375" name="Cogs-with-person-in-circle-65x65.png" descr="Cogs-with-person-in-circle-65x65.png"/>
             <p:cNvPicPr>
               <a:picLocks noChangeAspect="1"/>
             </p:cNvPicPr>
@@ -12413,7 +12409,7 @@
         </p:pic>
         <p:pic>
           <p:nvPicPr>
-            <p:cNvPr id="372" name="Cogs-in-circle-65x65.png" descr="Cogs-in-circle-65x65.png"/>
+            <p:cNvPr id="376" name="Cogs-in-circle-65x65.png" descr="Cogs-in-circle-65x65.png"/>
             <p:cNvPicPr>
               <a:picLocks noChangeAspect="1"/>
             </p:cNvPicPr>
@@ -12444,7 +12440,7 @@
         </p:pic>
         <p:pic>
           <p:nvPicPr>
-            <p:cNvPr id="373" name="Cogs-in-circle-65x65.png" descr="Cogs-in-circle-65x65.png"/>
+            <p:cNvPr id="377" name="Cogs-in-circle-65x65.png" descr="Cogs-in-circle-65x65.png"/>
             <p:cNvPicPr>
               <a:picLocks noChangeAspect="1"/>
             </p:cNvPicPr>
@@ -12475,7 +12471,7 @@
         </p:pic>
         <p:sp>
           <p:nvSpPr>
-            <p:cNvPr id="374" name="Parallelogram"/>
+            <p:cNvPr id="378" name="Parallelogram"/>
             <p:cNvSpPr/>
             <p:nvPr/>
           </p:nvSpPr>
@@ -12553,7 +12549,7 @@
         </p:sp>
         <p:sp>
           <p:nvSpPr>
-            <p:cNvPr id="375" name="Rectangle"/>
+            <p:cNvPr id="379" name="Rectangle"/>
             <p:cNvSpPr/>
             <p:nvPr/>
           </p:nvSpPr>
@@ -12594,7 +12590,7 @@
         </p:sp>
         <p:sp>
           <p:nvSpPr>
-            <p:cNvPr id="376" name="Shape"/>
+            <p:cNvPr id="380" name="Shape"/>
             <p:cNvSpPr/>
             <p:nvPr/>
           </p:nvSpPr>
@@ -12672,7 +12668,7 @@
         </p:sp>
         <p:sp>
           <p:nvSpPr>
-            <p:cNvPr id="377" name="Shape"/>
+            <p:cNvPr id="381" name="Shape"/>
             <p:cNvSpPr/>
             <p:nvPr/>
           </p:nvSpPr>
@@ -12750,7 +12746,7 @@
         </p:sp>
         <p:sp>
           <p:nvSpPr>
-            <p:cNvPr id="378" name="Shape"/>
+            <p:cNvPr id="382" name="Shape"/>
             <p:cNvSpPr/>
             <p:nvPr/>
           </p:nvSpPr>
@@ -12828,7 +12824,7 @@
         </p:sp>
         <p:sp>
           <p:nvSpPr>
-            <p:cNvPr id="379" name="Shape"/>
+            <p:cNvPr id="383" name="Shape"/>
             <p:cNvSpPr/>
             <p:nvPr/>
           </p:nvSpPr>
@@ -12906,7 +12902,7 @@
         </p:sp>
         <p:sp>
           <p:nvSpPr>
-            <p:cNvPr id="380" name="Shape"/>
+            <p:cNvPr id="384" name="Shape"/>
             <p:cNvSpPr/>
             <p:nvPr/>
           </p:nvSpPr>
@@ -12984,7 +12980,7 @@
         </p:sp>
         <p:sp>
           <p:nvSpPr>
-            <p:cNvPr id="381" name="Shape"/>
+            <p:cNvPr id="385" name="Shape"/>
             <p:cNvSpPr/>
             <p:nvPr/>
           </p:nvSpPr>
@@ -13062,7 +13058,7 @@
         </p:sp>
         <p:sp>
           <p:nvSpPr>
-            <p:cNvPr id="382" name="Deploy"/>
+            <p:cNvPr id="386" name="Deploy"/>
             <p:cNvSpPr txBox="1"/>
             <p:nvPr/>
           </p:nvSpPr>
@@ -13112,7 +13108,7 @@
         </p:sp>
         <p:sp>
           <p:nvSpPr>
-            <p:cNvPr id="383" name="Pre-…"/>
+            <p:cNvPr id="387" name="Pre-…"/>
             <p:cNvSpPr txBox="1"/>
             <p:nvPr/>
           </p:nvSpPr>
@@ -13183,7 +13179,7 @@
         </p:sp>
         <p:sp>
           <p:nvSpPr>
-            <p:cNvPr id="384" name="Operate…"/>
+            <p:cNvPr id="388" name="Operate…"/>
             <p:cNvSpPr txBox="1"/>
             <p:nvPr/>
           </p:nvSpPr>
@@ -13254,7 +13250,7 @@
         </p:sp>
         <p:sp>
           <p:nvSpPr>
-            <p:cNvPr id="385" name="Test"/>
+            <p:cNvPr id="389" name="Test"/>
             <p:cNvSpPr txBox="1"/>
             <p:nvPr/>
           </p:nvSpPr>
@@ -13304,7 +13300,7 @@
         </p:sp>
         <p:sp>
           <p:nvSpPr>
-            <p:cNvPr id="386" name="Build"/>
+            <p:cNvPr id="390" name="Build"/>
             <p:cNvSpPr txBox="1"/>
             <p:nvPr/>
           </p:nvSpPr>
@@ -13354,7 +13350,7 @@
         </p:sp>
         <p:sp>
           <p:nvSpPr>
-            <p:cNvPr id="387" name="Code"/>
+            <p:cNvPr id="391" name="Code"/>
             <p:cNvSpPr txBox="1"/>
             <p:nvPr/>
           </p:nvSpPr>
@@ -13401,7 +13397,7 @@
         </p:sp>
         <p:sp>
           <p:nvSpPr>
-            <p:cNvPr id="388" name="Plan"/>
+            <p:cNvPr id="392" name="Plan"/>
             <p:cNvSpPr txBox="1"/>
             <p:nvPr/>
           </p:nvSpPr>
@@ -13448,7 +13444,7 @@
         </p:sp>
         <p:sp>
           <p:nvSpPr>
-            <p:cNvPr id="389" name="· IDE Integration…"/>
+            <p:cNvPr id="393" name="· IDE Integration…"/>
             <p:cNvSpPr txBox="1"/>
             <p:nvPr/>
           </p:nvSpPr>
@@ -13556,7 +13552,7 @@
         </p:sp>
         <p:sp>
           <p:nvSpPr>
-            <p:cNvPr id="390" name="· SAST and SCA"/>
+            <p:cNvPr id="394" name="· SAST and SCA"/>
             <p:cNvSpPr txBox="1"/>
             <p:nvPr/>
           </p:nvSpPr>
@@ -13624,7 +13620,7 @@
         </p:sp>
         <p:sp>
           <p:nvSpPr>
-            <p:cNvPr id="391" name="· SCA Container…"/>
+            <p:cNvPr id="395" name="· SCA Container…"/>
             <p:cNvSpPr txBox="1"/>
             <p:nvPr/>
           </p:nvSpPr>
@@ -13715,7 +13711,7 @@
         </p:sp>
         <p:sp>
           <p:nvSpPr>
-            <p:cNvPr id="392" name="Application Security Pipeline"/>
+            <p:cNvPr id="396" name="Application Security Pipeline"/>
             <p:cNvSpPr txBox="1"/>
             <p:nvPr/>
           </p:nvSpPr>
@@ -13800,7 +13796,7 @@
       </p:grpSpPr>
       <p:sp>
         <p:nvSpPr>
-          <p:cNvPr id="395" name="Open Source LICENSE IDENTIFICATION and Management"/>
+          <p:cNvPr id="399" name="Open Source LICENSE IDENTIFICATION and Management"/>
           <p:cNvSpPr txBox="1">
             <a:spLocks noGrp="1"/>
           </p:cNvSpPr>
@@ -13844,7 +13840,7 @@
       </p:sp>
       <p:sp>
         <p:nvSpPr>
-          <p:cNvPr id="396" name="Slide Number"/>
+          <p:cNvPr id="400" name="Slide Number"/>
           <p:cNvSpPr txBox="1">
             <a:spLocks noGrp="1"/>
           </p:cNvSpPr>
@@ -13891,7 +13887,7 @@
       </p:sp>
       <p:sp>
         <p:nvSpPr>
-          <p:cNvPr id="397" name="MIT License…"/>
+          <p:cNvPr id="401" name="MIT License…"/>
           <p:cNvSpPr txBox="1">
             <a:spLocks noGrp="1"/>
           </p:cNvSpPr>
@@ -14029,7 +14025,7 @@
       </p:sp>
       <p:sp>
         <p:nvSpPr>
-          <p:cNvPr id="398" name="South Florida Developer Conference  (SoFlo Dev Con 2024)        Saturday, May 4, 2024"/>
+          <p:cNvPr id="402" name="South Florida Developer Conference  (SoFlo Dev Con 2024)        Saturday, May 4, 2024"/>
           <p:cNvSpPr txBox="1"/>
           <p:nvPr/>
         </p:nvSpPr>
@@ -14081,7 +14077,7 @@
       </p:sp>
       <p:grpSp>
         <p:nvGrpSpPr>
-          <p:cNvPr id="401" name="Group"/>
+          <p:cNvPr id="405" name="Group"/>
           <p:cNvGrpSpPr/>
           <p:nvPr/>
         </p:nvGrpSpPr>
@@ -14095,7 +14091,7 @@
         </p:grpSpPr>
         <p:sp>
           <p:nvSpPr>
-            <p:cNvPr id="399" name="GNU GPL (License conflict)"/>
+            <p:cNvPr id="403" name="GNU GPL (License conflict)"/>
             <p:cNvSpPr txBox="1"/>
             <p:nvPr/>
           </p:nvSpPr>
@@ -14282,7 +14278,7 @@
         </p:sp>
         <p:sp>
           <p:nvSpPr>
-            <p:cNvPr id="400" name="Source: https://www.gnu.org/licenses/gpl-3.0.en.html"/>
+            <p:cNvPr id="404" name="Source: https://www.gnu.org/licenses/gpl-3.0.en.html"/>
             <p:cNvSpPr/>
             <p:nvPr/>
           </p:nvSpPr>
@@ -14392,7 +14388,7 @@
                                       <p:cBhvr>
                                         <p:cTn id="6" fill="hold"/>
                                         <p:tgtEl>
-                                          <p:spTgt spid="397"/>
+                                          <p:spTgt spid="401"/>
                                         </p:tgtEl>
                                         <p:attrNameLst>
                                           <p:attrName>style.visibility</p:attrName>
@@ -14436,7 +14432,7 @@
                                       <p:cBhvr>
                                         <p:cTn id="10" fill="hold"/>
                                         <p:tgtEl>
-                                          <p:spTgt spid="401"/>
+                                          <p:spTgt spid="405"/>
                                         </p:tgtEl>
                                         <p:attrNameLst>
                                           <p:attrName>style.visibility</p:attrName>
@@ -14477,8 +14473,8 @@
       </p:par>
     </p:tnLst>
     <p:bldLst>
-      <p:bldP spid="397" grpId="1" animBg="1" advAuto="0"/>
-      <p:bldP spid="401" grpId="2" animBg="1" advAuto="0"/>
+      <p:bldP spid="401" grpId="1" animBg="1" advAuto="0"/>
+      <p:bldP spid="405" grpId="2" animBg="1" advAuto="0"/>
     </p:bldLst>
   </p:timing>
 </p:sld>
@@ -14699,7 +14695,7 @@
         </p:nvSpPr>
         <p:spPr>
           <a:xfrm>
-            <a:off x="18307888" y="2264289"/>
+            <a:off x="20225588" y="1946789"/>
             <a:ext cx="1232298" cy="1143001"/>
           </a:xfrm>
           <a:prstGeom prst="rect">
@@ -14754,7 +14750,7 @@
         </p:blipFill>
         <p:spPr>
           <a:xfrm>
-            <a:off x="18306341" y="2243360"/>
+            <a:off x="20236741" y="1938560"/>
             <a:ext cx="1232298" cy="1133714"/>
           </a:xfrm>
           <a:prstGeom prst="rect">
@@ -14785,7 +14781,7 @@
         </p:blipFill>
         <p:spPr>
           <a:xfrm>
-            <a:off x="16814800" y="3721559"/>
+            <a:off x="18618200" y="2972259"/>
             <a:ext cx="1592687" cy="1592687"/>
           </a:xfrm>
           <a:prstGeom prst="rect">
@@ -14799,7 +14795,7 @@
       <p:pic>
         <p:nvPicPr>
           <p:cNvPr id="183" name="SCR20146-Seals-Final-CSPO.png" descr="SCR20146-Seals-Final-CSPO.png">
-            <a:hlinkClick r:id="rId6"/>
+            <a:hlinkClick r:id="rId8"/>
           </p:cNvPr>
           <p:cNvPicPr>
             <a:picLocks noChangeAspect="1"/>
@@ -14807,7 +14803,7 @@
           <p:nvPr/>
         </p:nvPicPr>
         <p:blipFill>
-          <a:blip r:embed="rId8">
+          <a:blip r:embed="rId9">
             <a:extLst/>
           </a:blip>
           <a:stretch>
@@ -14816,7 +14812,7 @@
         </p:blipFill>
         <p:spPr>
           <a:xfrm>
-            <a:off x="18251056" y="3721559"/>
+            <a:off x="20054456" y="2984959"/>
             <a:ext cx="1592687" cy="1592687"/>
           </a:xfrm>
           <a:prstGeom prst="rect">
@@ -14830,37 +14826,8 @@
       <p:pic>
         <p:nvPicPr>
           <p:cNvPr id="184" name="InBug-60px-R.png" descr="InBug-60px-R.png">
-            <a:hlinkClick r:id="rId9"/>
+            <a:hlinkClick r:id="rId10"/>
           </p:cNvPr>
-          <p:cNvPicPr>
-            <a:picLocks noChangeAspect="1"/>
-          </p:cNvPicPr>
-          <p:nvPr/>
-        </p:nvPicPr>
-        <p:blipFill>
-          <a:blip r:embed="rId10">
-            <a:extLst/>
-          </a:blip>
-          <a:stretch>
-            <a:fillRect/>
-          </a:stretch>
-        </p:blipFill>
-        <p:spPr>
-          <a:xfrm>
-            <a:off x="16962180" y="2289850"/>
-            <a:ext cx="1297931" cy="1096843"/>
-          </a:xfrm>
-          <a:prstGeom prst="rect">
-            <a:avLst/>
-          </a:prstGeom>
-          <a:ln w="12700">
-            <a:miter lim="400000"/>
-          </a:ln>
-        </p:spPr>
-      </p:pic>
-      <p:pic>
-        <p:nvPicPr>
-          <p:cNvPr id="185" name="10801856_617842765005711_6029313432564090121_n-2.jpg" descr="10801856_617842765005711_6029313432564090121_n-2.jpg"/>
           <p:cNvPicPr>
             <a:picLocks noChangeAspect="1"/>
           </p:cNvPicPr>
@@ -14876,8 +14843,8 @@
         </p:blipFill>
         <p:spPr>
           <a:xfrm>
-            <a:off x="12875797" y="2006037"/>
-            <a:ext cx="3634940" cy="5199845"/>
+            <a:off x="18904804" y="1957075"/>
+            <a:ext cx="1297931" cy="1096843"/>
           </a:xfrm>
           <a:prstGeom prst="rect">
             <a:avLst/>
@@ -14889,7 +14856,7 @@
       </p:pic>
       <p:pic>
         <p:nvPicPr>
-          <p:cNvPr id="186" name="classroom-727x409-60.jpg" descr="classroom-727x409-60.jpg"/>
+          <p:cNvPr id="185" name="10801856_617842765005711_6029313432564090121_n-2.jpg" descr="10801856_617842765005711_6029313432564090121_n-2.jpg"/>
           <p:cNvPicPr>
             <a:picLocks noChangeAspect="1"/>
           </p:cNvPicPr>
@@ -14905,8 +14872,37 @@
         </p:blipFill>
         <p:spPr>
           <a:xfrm>
-            <a:off x="2984500" y="2006600"/>
-            <a:ext cx="9232900" cy="5194300"/>
+            <a:off x="14818897" y="1967937"/>
+            <a:ext cx="3581672" cy="5123645"/>
+          </a:xfrm>
+          <a:prstGeom prst="rect">
+            <a:avLst/>
+          </a:prstGeom>
+          <a:ln w="12700">
+            <a:miter lim="400000"/>
+          </a:ln>
+        </p:spPr>
+      </p:pic>
+      <p:pic>
+        <p:nvPicPr>
+          <p:cNvPr id="186" name="2023-classroom-976x400-30.jpg" descr="2023-classroom-976x400-30.jpg"/>
+          <p:cNvPicPr>
+            <a:picLocks noChangeAspect="1"/>
+          </p:cNvPicPr>
+          <p:nvPr/>
+        </p:nvPicPr>
+        <p:blipFill>
+          <a:blip r:embed="rId13">
+            <a:extLst/>
+          </a:blip>
+          <a:stretch>
+            <a:fillRect/>
+          </a:stretch>
+        </p:blipFill>
+        <p:spPr>
+          <a:xfrm>
+            <a:off x="2133962" y="2003302"/>
+            <a:ext cx="12395201" cy="5080001"/>
           </a:xfrm>
           <a:prstGeom prst="rect">
             <a:avLst/>
@@ -14916,9 +14912,133 @@
           </a:ln>
         </p:spPr>
       </p:pic>
+      <p:pic>
+        <p:nvPicPr>
+          <p:cNvPr id="187" name="AIPMM-CPM-102x102.png" descr="AIPMM-CPM-102x102.png">
+            <a:hlinkClick r:id="rId14"/>
+          </p:cNvPr>
+          <p:cNvPicPr>
+            <a:picLocks noChangeAspect="1"/>
+          </p:cNvPicPr>
+          <p:nvPr/>
+        </p:nvPicPr>
+        <p:blipFill>
+          <a:blip r:embed="rId15">
+            <a:extLst/>
+          </a:blip>
+          <a:stretch>
+            <a:fillRect/>
+          </a:stretch>
+        </p:blipFill>
+        <p:spPr>
+          <a:xfrm>
+            <a:off x="18766829" y="5863431"/>
+            <a:ext cx="1295401" cy="1295401"/>
+          </a:xfrm>
+          <a:prstGeom prst="rect">
+            <a:avLst/>
+          </a:prstGeom>
+          <a:ln w="25400">
+            <a:miter lim="400000"/>
+          </a:ln>
+        </p:spPr>
+      </p:pic>
+      <p:pic>
+        <p:nvPicPr>
+          <p:cNvPr id="188" name="SAFe-Agilist-89x102.png" descr="SAFe-Agilist-89x102.png">
+            <a:hlinkClick r:id="rId16"/>
+          </p:cNvPr>
+          <p:cNvPicPr>
+            <a:picLocks noChangeAspect="1"/>
+          </p:cNvPicPr>
+          <p:nvPr/>
+        </p:nvPicPr>
+        <p:blipFill>
+          <a:blip r:embed="rId17">
+            <a:extLst/>
+          </a:blip>
+          <a:stretch>
+            <a:fillRect/>
+          </a:stretch>
+        </p:blipFill>
+        <p:spPr>
+          <a:xfrm>
+            <a:off x="18816135" y="4433490"/>
+            <a:ext cx="1196789" cy="1371601"/>
+          </a:xfrm>
+          <a:prstGeom prst="rect">
+            <a:avLst/>
+          </a:prstGeom>
+          <a:ln w="25400">
+            <a:miter lim="400000"/>
+          </a:ln>
+        </p:spPr>
+      </p:pic>
+      <p:pic>
+        <p:nvPicPr>
+          <p:cNvPr id="189" name="AWS-ASS-RBG-92x102.png" descr="AWS-ASS-RBG-92x102.png">
+            <a:hlinkClick r:id="rId18"/>
+          </p:cNvPr>
+          <p:cNvPicPr>
+            <a:picLocks noChangeAspect="1"/>
+          </p:cNvPicPr>
+          <p:nvPr/>
+        </p:nvPicPr>
+        <p:blipFill>
+          <a:blip r:embed="rId19">
+            <a:extLst/>
+          </a:blip>
+          <a:stretch>
+            <a:fillRect/>
+          </a:stretch>
+        </p:blipFill>
+        <p:spPr>
+          <a:xfrm>
+            <a:off x="20244837" y="4471590"/>
+            <a:ext cx="1168401" cy="1295401"/>
+          </a:xfrm>
+          <a:prstGeom prst="rect">
+            <a:avLst/>
+          </a:prstGeom>
+          <a:ln w="25400">
+            <a:miter lim="400000"/>
+          </a:ln>
+        </p:spPr>
+      </p:pic>
+      <p:pic>
+        <p:nvPicPr>
+          <p:cNvPr id="190" name="KCNA_badge-black-102x102.png" descr="KCNA_badge-black-102x102.png">
+            <a:hlinkClick r:id="rId20"/>
+          </p:cNvPr>
+          <p:cNvPicPr>
+            <a:picLocks noChangeAspect="1"/>
+          </p:cNvPicPr>
+          <p:nvPr/>
+        </p:nvPicPr>
+        <p:blipFill>
+          <a:blip r:embed="rId21">
+            <a:extLst/>
+          </a:blip>
+          <a:stretch>
+            <a:fillRect/>
+          </a:stretch>
+        </p:blipFill>
+        <p:spPr>
+          <a:xfrm>
+            <a:off x="20205189" y="5863431"/>
+            <a:ext cx="1295401" cy="1295401"/>
+          </a:xfrm>
+          <a:prstGeom prst="rect">
+            <a:avLst/>
+          </a:prstGeom>
+          <a:ln w="25400">
+            <a:miter lim="400000"/>
+          </a:ln>
+        </p:spPr>
+      </p:pic>
       <p:sp>
         <p:nvSpPr>
-          <p:cNvPr id="187" name="South Florida Developer Conference  (SoFlo Dev Con 2024)        Saturday, May 4, 2024"/>
+          <p:cNvPr id="191" name="South Florida Developer Conference  (SoFlo Dev Con 2024)        Saturday, May 4, 2024"/>
           <p:cNvSpPr txBox="1"/>
           <p:nvPr/>
         </p:nvSpPr>
@@ -14996,7 +15116,7 @@
       </p:grpSpPr>
       <p:sp>
         <p:nvSpPr>
-          <p:cNvPr id="405" name="Why GPL causes a conflict"/>
+          <p:cNvPr id="409" name="Why GPL causes a conflict"/>
           <p:cNvSpPr txBox="1">
             <a:spLocks noGrp="1"/>
           </p:cNvSpPr>
@@ -15040,7 +15160,7 @@
       </p:sp>
       <p:sp>
         <p:nvSpPr>
-          <p:cNvPr id="406" name="Slide Number"/>
+          <p:cNvPr id="410" name="Slide Number"/>
           <p:cNvSpPr txBox="1">
             <a:spLocks noGrp="1"/>
           </p:cNvSpPr>
@@ -15087,7 +15207,7 @@
       </p:sp>
       <p:sp>
         <p:nvSpPr>
-          <p:cNvPr id="407" name="Copyleft Requirement: Any derivative work created from a GPL licensed cost must be distributed under the GPL which includes the source code of the entire derivative work."/>
+          <p:cNvPr id="411" name="Copyleft Requirement: Any derivative work created from a GPL licensed cost must be distributed under the GPL which includes the source code of the entire derivative work."/>
           <p:cNvSpPr txBox="1">
             <a:spLocks noGrp="1"/>
           </p:cNvSpPr>
@@ -15147,7 +15267,7 @@
       </p:sp>
       <p:sp>
         <p:nvSpPr>
-          <p:cNvPr id="408" name="South Florida Developer Conference  (SoFlo Dev Con 2024)        Saturday, May 4, 2024"/>
+          <p:cNvPr id="412" name="South Florida Developer Conference  (SoFlo Dev Con 2024)        Saturday, May 4, 2024"/>
           <p:cNvSpPr txBox="1"/>
           <p:nvPr/>
         </p:nvSpPr>
@@ -15199,7 +15319,7 @@
       </p:sp>
       <p:grpSp>
         <p:nvGrpSpPr>
-          <p:cNvPr id="411" name="Group"/>
+          <p:cNvPr id="415" name="Group"/>
           <p:cNvGrpSpPr/>
           <p:nvPr/>
         </p:nvGrpSpPr>
@@ -15213,7 +15333,7 @@
         </p:grpSpPr>
         <p:sp>
           <p:nvSpPr>
-            <p:cNvPr id="409" name="Examples:…"/>
+            <p:cNvPr id="413" name="Examples:…"/>
             <p:cNvSpPr txBox="1"/>
             <p:nvPr/>
           </p:nvSpPr>
@@ -15396,7 +15516,7 @@
         </p:sp>
         <p:sp>
           <p:nvSpPr>
-            <p:cNvPr id="410" name="Source: https://www.fsf.org/news/2008-12-cisco-suit"/>
+            <p:cNvPr id="414" name="Source: https://www.fsf.org/news/2008-12-cisco-suit"/>
             <p:cNvSpPr txBox="1"/>
             <p:nvPr/>
           </p:nvSpPr>
@@ -15506,7 +15626,7 @@
                                       <p:cBhvr>
                                         <p:cTn id="6" fill="hold"/>
                                         <p:tgtEl>
-                                          <p:spTgt spid="407"/>
+                                          <p:spTgt spid="411"/>
                                         </p:tgtEl>
                                         <p:attrNameLst>
                                           <p:attrName>style.visibility</p:attrName>
@@ -15550,7 +15670,7 @@
                                       <p:cBhvr>
                                         <p:cTn id="10" fill="hold"/>
                                         <p:tgtEl>
-                                          <p:spTgt spid="411"/>
+                                          <p:spTgt spid="415"/>
                                         </p:tgtEl>
                                         <p:attrNameLst>
                                           <p:attrName>style.visibility</p:attrName>
@@ -15591,8 +15711,8 @@
       </p:par>
     </p:tnLst>
     <p:bldLst>
-      <p:bldP spid="407" grpId="1" animBg="1" advAuto="0"/>
-      <p:bldP spid="411" grpId="2" animBg="1" advAuto="0"/>
+      <p:bldP spid="411" grpId="1" animBg="1" advAuto="0"/>
+      <p:bldP spid="415" grpId="2" animBg="1" advAuto="0"/>
     </p:bldLst>
   </p:timing>
 </p:sld>
@@ -15617,7 +15737,7 @@
       </p:grpSpPr>
       <p:sp>
         <p:nvSpPr>
-          <p:cNvPr id="413" name="Slide Number"/>
+          <p:cNvPr id="417" name="Slide Number"/>
           <p:cNvSpPr txBox="1">
             <a:spLocks noGrp="1"/>
           </p:cNvSpPr>
@@ -15664,7 +15784,7 @@
       </p:sp>
       <p:sp>
         <p:nvSpPr>
-          <p:cNvPr id="414" name="SCA Tools recommend the latest version"/>
+          <p:cNvPr id="418" name="SCA Tools recommend the latest version"/>
           <p:cNvSpPr txBox="1">
             <a:spLocks noGrp="1"/>
           </p:cNvSpPr>
@@ -15705,7 +15825,7 @@
       </p:sp>
       <p:pic>
         <p:nvPicPr>
-          <p:cNvPr id="415" name="91-percent-old-versions-30.jpg" descr="91-percent-old-versions-30.jpg"/>
+          <p:cNvPr id="419" name="91-percent-old-versions-30.jpg" descr="91-percent-old-versions-30.jpg"/>
           <p:cNvPicPr>
             <a:picLocks noChangeAspect="1"/>
           </p:cNvPicPr>
@@ -15734,7 +15854,7 @@
       </p:pic>
       <p:sp>
         <p:nvSpPr>
-          <p:cNvPr id="416" name="Source: Synopsys Open Source Security and Risk Report, Feb 2024"/>
+          <p:cNvPr id="420" name="Source: Synopsys Open Source Security and Risk Report, Feb 2024"/>
           <p:cNvSpPr txBox="1"/>
           <p:nvPr/>
         </p:nvSpPr>
@@ -15792,7 +15912,7 @@
       </p:sp>
       <p:pic>
         <p:nvPicPr>
-          <p:cNvPr id="417" name="96-percent-bar-30.jpg" descr="96-percent-bar-30.jpg"/>
+          <p:cNvPr id="421" name="96-percent-bar-30.jpg" descr="96-percent-bar-30.jpg"/>
           <p:cNvPicPr>
             <a:picLocks noChangeAspect="1"/>
           </p:cNvPicPr>
@@ -15821,7 +15941,7 @@
       </p:pic>
       <p:sp>
         <p:nvSpPr>
-          <p:cNvPr id="418" name="Source: Sonatype 9th Annual State of the Software Supply Chain Report, Nov 2023"/>
+          <p:cNvPr id="422" name="Source: Sonatype 9th Annual State of the Software Supply Chain Report, Nov 2023"/>
           <p:cNvSpPr txBox="1"/>
           <p:nvPr/>
         </p:nvSpPr>
@@ -15879,7 +15999,7 @@
       </p:sp>
       <p:sp>
         <p:nvSpPr>
-          <p:cNvPr id="419" name="South Florida Developer Conference  (SoFlo Dev Con 2024)        Saturday, May 4, 2024"/>
+          <p:cNvPr id="423" name="South Florida Developer Conference  (SoFlo Dev Con 2024)        Saturday, May 4, 2024"/>
           <p:cNvSpPr txBox="1"/>
           <p:nvPr/>
         </p:nvSpPr>
@@ -15931,7 +16051,7 @@
       </p:sp>
       <p:sp>
         <p:nvSpPr>
-          <p:cNvPr id="420" name="OPEN SOURCE Version management"/>
+          <p:cNvPr id="424" name="OPEN SOURCE Version management"/>
           <p:cNvSpPr txBox="1">
             <a:spLocks noGrp="1"/>
           </p:cNvSpPr>
@@ -16023,7 +16143,7 @@
                                       <p:cBhvr>
                                         <p:cTn id="6" fill="hold"/>
                                         <p:tgtEl>
-                                          <p:spTgt spid="414">
+                                          <p:spTgt spid="418">
                                             <p:bg/>
                                           </p:spTgt>
                                         </p:tgtEl>
@@ -16051,7 +16171,7 @@
                                       <p:cBhvr>
                                         <p:cTn id="8" fill="hold"/>
                                         <p:tgtEl>
-                                          <p:spTgt spid="414">
+                                          <p:spTgt spid="418">
                                             <p:txEl>
                                               <p:pRg st="0" end="0"/>
                                             </p:txEl>
@@ -16096,7 +16216,7 @@
       </p:par>
     </p:tnLst>
     <p:bldLst>
-      <p:bldP spid="414" grpId="1" build="p" bldLvl="5" animBg="1" advAuto="0"/>
+      <p:bldP spid="418" grpId="1" build="p" bldLvl="5" animBg="1" advAuto="0"/>
     </p:bldLst>
   </p:timing>
 </p:sld>
@@ -16121,7 +16241,7 @@
       </p:grpSpPr>
       <p:sp>
         <p:nvSpPr>
-          <p:cNvPr id="424" name="Slide Number"/>
+          <p:cNvPr id="428" name="Slide Number"/>
           <p:cNvSpPr txBox="1">
             <a:spLocks noGrp="1"/>
           </p:cNvSpPr>
@@ -16168,7 +16288,7 @@
       </p:sp>
       <p:sp>
         <p:nvSpPr>
-          <p:cNvPr id="425" name="Source: Sonatype 9th Annual State of the Software Supply Chain Report, Nov 2023"/>
+          <p:cNvPr id="429" name="Source: Sonatype 9th Annual State of the Software Supply Chain Report, Nov 2023"/>
           <p:cNvSpPr txBox="1"/>
           <p:nvPr/>
         </p:nvSpPr>
@@ -16226,7 +16346,7 @@
       </p:sp>
       <p:sp>
         <p:nvSpPr>
-          <p:cNvPr id="426" name="“The fact that 18.6% of [open source] projects stopped being maintained in the last year…"/>
+          <p:cNvPr id="430" name="“The fact that 18.6% of [open source] projects stopped being maintained in the last year…"/>
           <p:cNvSpPr txBox="1"/>
           <p:nvPr/>
         </p:nvSpPr>
@@ -16319,7 +16439,7 @@
       </p:sp>
       <p:sp>
         <p:nvSpPr>
-          <p:cNvPr id="427" name="* maintained as defined by the OpenSSF (Open Source Security Foundation) scorecard"/>
+          <p:cNvPr id="431" name="* maintained as defined by the OpenSSF (Open Source Security Foundation) scorecard"/>
           <p:cNvSpPr txBox="1"/>
           <p:nvPr/>
         </p:nvSpPr>
@@ -16371,7 +16491,7 @@
       </p:sp>
       <p:sp>
         <p:nvSpPr>
-          <p:cNvPr id="428" name="South Florida Developer Conference  (SoFlo Dev Con 2024)        Saturday, May 4, 2024"/>
+          <p:cNvPr id="432" name="South Florida Developer Conference  (SoFlo Dev Con 2024)        Saturday, May 4, 2024"/>
           <p:cNvSpPr txBox="1"/>
           <p:nvPr/>
         </p:nvSpPr>
@@ -16423,7 +16543,7 @@
       </p:sp>
       <p:sp>
         <p:nvSpPr>
-          <p:cNvPr id="429" name="OPEN SOURCE QUality management"/>
+          <p:cNvPr id="433" name="OPEN SOURCE QUality management"/>
           <p:cNvSpPr txBox="1">
             <a:spLocks noGrp="1"/>
           </p:cNvSpPr>
@@ -16504,7 +16624,7 @@
       </p:grpSpPr>
       <p:pic>
         <p:nvPicPr>
-          <p:cNvPr id="433" name="SBOM-200x200-30.jpg" descr="SBOM-200x200-30.jpg"/>
+          <p:cNvPr id="437" name="Security-Pipeline-bg-black-80.jpg" descr="Security-Pipeline-bg-black-80.jpg"/>
           <p:cNvPicPr>
             <a:picLocks noChangeAspect="1"/>
           </p:cNvPicPr>
@@ -16520,8 +16640,8 @@
         </p:blipFill>
         <p:spPr>
           <a:xfrm>
-            <a:off x="5257800" y="7302500"/>
-            <a:ext cx="2540000" cy="2540000"/>
+            <a:off x="462862" y="9882194"/>
+            <a:ext cx="5568864" cy="2597515"/>
           </a:xfrm>
           <a:prstGeom prst="rect">
             <a:avLst/>
@@ -16533,7 +16653,7 @@
       </p:pic>
       <p:pic>
         <p:nvPicPr>
-          <p:cNvPr id="434" name="Abstract-SCA-300x300-30.jpg" descr="Abstract-SCA-300x300-30.jpg"/>
+          <p:cNvPr id="438" name="SBOM-200x200-30.jpg" descr="SBOM-200x200-30.jpg"/>
           <p:cNvPicPr>
             <a:picLocks noChangeAspect="1"/>
           </p:cNvPicPr>
@@ -16549,6 +16669,35 @@
         </p:blipFill>
         <p:spPr>
           <a:xfrm>
+            <a:off x="5257800" y="7302500"/>
+            <a:ext cx="2540000" cy="2540000"/>
+          </a:xfrm>
+          <a:prstGeom prst="rect">
+            <a:avLst/>
+          </a:prstGeom>
+          <a:ln w="25400">
+            <a:miter lim="400000"/>
+          </a:ln>
+        </p:spPr>
+      </p:pic>
+      <p:pic>
+        <p:nvPicPr>
+          <p:cNvPr id="439" name="Abstract-SCA-300x300-30.jpg" descr="Abstract-SCA-300x300-30.jpg"/>
+          <p:cNvPicPr>
+            <a:picLocks noChangeAspect="1"/>
+          </p:cNvPicPr>
+          <p:nvPr/>
+        </p:nvPicPr>
+        <p:blipFill>
+          <a:blip r:embed="rId5">
+            <a:extLst/>
+          </a:blip>
+          <a:stretch>
+            <a:fillRect/>
+          </a:stretch>
+        </p:blipFill>
+        <p:spPr>
+          <a:xfrm>
             <a:off x="8968898" y="4222973"/>
             <a:ext cx="4286066" cy="4286066"/>
           </a:xfrm>
@@ -16562,7 +16711,7 @@
       </p:pic>
       <p:sp>
         <p:nvSpPr>
-          <p:cNvPr id="435" name="Slide Number"/>
+          <p:cNvPr id="440" name="Slide Number"/>
           <p:cNvSpPr txBox="1">
             <a:spLocks noGrp="1"/>
           </p:cNvSpPr>
@@ -16609,7 +16758,7 @@
       </p:sp>
       <p:grpSp>
         <p:nvGrpSpPr>
-          <p:cNvPr id="438" name="SCA…"/>
+          <p:cNvPr id="443" name="SCA…"/>
           <p:cNvGrpSpPr/>
           <p:nvPr/>
         </p:nvGrpSpPr>
@@ -16623,7 +16772,7 @@
         </p:grpSpPr>
         <p:sp>
           <p:nvSpPr>
-            <p:cNvPr id="437" name="SCA…"/>
+            <p:cNvPr id="442" name="SCA…"/>
             <p:cNvSpPr txBox="1"/>
             <p:nvPr/>
           </p:nvSpPr>
@@ -16636,7 +16785,7 @@
               <a:avLst/>
             </a:prstGeom>
             <a:blipFill rotWithShape="1">
-              <a:blip r:embed="rId5">
+              <a:blip r:embed="rId6">
                 <a:alphaModFix amt="89613"/>
               </a:blip>
               <a:srcRect/>
@@ -16687,14 +16836,14 @@
         </p:sp>
         <p:pic>
           <p:nvPicPr>
-            <p:cNvPr id="436" name="SCA… SCAService" descr="SCA… SCAService"/>
+            <p:cNvPr id="441" name="SCA… SCAService" descr="SCA… SCAService"/>
             <p:cNvPicPr>
               <a:picLocks/>
             </p:cNvPicPr>
             <p:nvPr/>
           </p:nvPicPr>
           <p:blipFill>
-            <a:blip r:embed="rId6">
+            <a:blip r:embed="rId7">
               <a:alphaModFix amt="89613"/>
               <a:extLst/>
             </a:blip>
@@ -16716,7 +16865,7 @@
       </p:grpSp>
       <p:sp>
         <p:nvSpPr>
-          <p:cNvPr id="439" name="Line"/>
+          <p:cNvPr id="444" name="Line"/>
           <p:cNvSpPr/>
           <p:nvPr/>
         </p:nvSpPr>
@@ -16760,7 +16909,7 @@
       </p:sp>
       <p:sp>
         <p:nvSpPr>
-          <p:cNvPr id="440" name="Line"/>
+          <p:cNvPr id="445" name="Line"/>
           <p:cNvSpPr/>
           <p:nvPr/>
         </p:nvSpPr>
@@ -16804,7 +16953,7 @@
       </p:sp>
       <p:sp>
         <p:nvSpPr>
-          <p:cNvPr id="441" name="Line"/>
+          <p:cNvPr id="446" name="Line"/>
           <p:cNvSpPr/>
           <p:nvPr/>
         </p:nvSpPr>
@@ -16848,7 +16997,7 @@
       </p:sp>
       <p:sp>
         <p:nvSpPr>
-          <p:cNvPr id="442" name="Line"/>
+          <p:cNvPr id="447" name="Line"/>
           <p:cNvSpPr/>
           <p:nvPr/>
         </p:nvSpPr>
@@ -16892,7 +17041,7 @@
       </p:sp>
       <p:sp>
         <p:nvSpPr>
-          <p:cNvPr id="443" name="Line"/>
+          <p:cNvPr id="448" name="Line"/>
           <p:cNvSpPr/>
           <p:nvPr/>
         </p:nvSpPr>
@@ -16936,7 +17085,7 @@
       </p:sp>
       <p:sp>
         <p:nvSpPr>
-          <p:cNvPr id="444" name="Line"/>
+          <p:cNvPr id="449" name="Line"/>
           <p:cNvSpPr/>
           <p:nvPr/>
         </p:nvSpPr>
@@ -16980,14 +17129,14 @@
       </p:sp>
       <p:sp>
         <p:nvSpPr>
-          <p:cNvPr id="445" name="SBOM"/>
+          <p:cNvPr id="450" name="SBOM"/>
           <p:cNvSpPr txBox="1"/>
           <p:nvPr/>
         </p:nvSpPr>
         <p:spPr>
           <a:xfrm>
-            <a:off x="5923528" y="9615876"/>
-            <a:ext cx="1408897" cy="701676"/>
+            <a:off x="5747541" y="9615876"/>
+            <a:ext cx="1560518" cy="701676"/>
           </a:xfrm>
           <a:prstGeom prst="rect">
             <a:avLst/>
@@ -17002,7 +17151,7 @@
           </a:extLst>
         </p:spPr>
         <p:txBody>
-          <a:bodyPr wrap="square" lIns="71437" tIns="71437" rIns="71437" bIns="71437" anchor="ctr">
+          <a:bodyPr lIns="71437" tIns="71437" rIns="71437" bIns="71437" anchor="ctr">
             <a:spAutoFit/>
           </a:bodyPr>
           <a:lstStyle>
@@ -17017,7 +17166,6 @@
           </a:lstStyle>
           <a:p>
             <a:r>
-              <a:rPr dirty="0"/>
               <a:t>SBOM</a:t>
             </a:r>
           </a:p>
@@ -17025,7 +17173,7 @@
       </p:sp>
       <p:sp>
         <p:nvSpPr>
-          <p:cNvPr id="446" name="Line"/>
+          <p:cNvPr id="451" name="Line"/>
           <p:cNvSpPr/>
           <p:nvPr/>
         </p:nvSpPr>
@@ -17069,7 +17217,7 @@
       </p:sp>
       <p:sp>
         <p:nvSpPr>
-          <p:cNvPr id="447" name="24/7 Monitoring"/>
+          <p:cNvPr id="452" name="24/7 Monitoring"/>
           <p:cNvSpPr txBox="1"/>
           <p:nvPr/>
         </p:nvSpPr>
@@ -17113,7 +17261,7 @@
       </p:sp>
       <p:sp>
         <p:nvSpPr>
-          <p:cNvPr id="448" name="NVD et al."/>
+          <p:cNvPr id="453" name="NVD et al."/>
           <p:cNvSpPr txBox="1"/>
           <p:nvPr/>
         </p:nvSpPr>
@@ -17155,38 +17303,9 @@
           </a:p>
         </p:txBody>
       </p:sp>
-      <p:pic>
-        <p:nvPicPr>
-          <p:cNvPr id="449" name="Security-Pipeline-bg-black-80.jpg" descr="Security-Pipeline-bg-black-80.jpg"/>
-          <p:cNvPicPr>
-            <a:picLocks noChangeAspect="1"/>
-          </p:cNvPicPr>
-          <p:nvPr/>
-        </p:nvPicPr>
-        <p:blipFill>
-          <a:blip r:embed="rId7">
-            <a:extLst/>
-          </a:blip>
-          <a:stretch>
-            <a:fillRect/>
-          </a:stretch>
-        </p:blipFill>
-        <p:spPr>
-          <a:xfrm>
-            <a:off x="462862" y="9882194"/>
-            <a:ext cx="5568864" cy="2597515"/>
-          </a:xfrm>
-          <a:prstGeom prst="rect">
-            <a:avLst/>
-          </a:prstGeom>
-          <a:ln w="25400">
-            <a:miter lim="400000"/>
-          </a:ln>
-        </p:spPr>
-      </p:pic>
       <p:sp>
         <p:nvSpPr>
-          <p:cNvPr id="450" name="Line"/>
+          <p:cNvPr id="454" name="Line"/>
           <p:cNvSpPr/>
           <p:nvPr/>
         </p:nvSpPr>
@@ -17230,7 +17349,7 @@
       </p:sp>
       <p:sp>
         <p:nvSpPr>
-          <p:cNvPr id="451" name="Pipeline"/>
+          <p:cNvPr id="455" name="Pipeline"/>
           <p:cNvSpPr txBox="1"/>
           <p:nvPr/>
         </p:nvSpPr>
@@ -17274,7 +17393,7 @@
       </p:sp>
       <p:sp>
         <p:nvSpPr>
-          <p:cNvPr id="452" name="Line"/>
+          <p:cNvPr id="456" name="Line"/>
           <p:cNvSpPr/>
           <p:nvPr/>
         </p:nvSpPr>
@@ -17318,7 +17437,7 @@
       </p:sp>
       <p:sp>
         <p:nvSpPr>
-          <p:cNvPr id="453" name="Email"/>
+          <p:cNvPr id="457" name="Email"/>
           <p:cNvSpPr txBox="1"/>
           <p:nvPr/>
         </p:nvSpPr>
@@ -17362,7 +17481,7 @@
       </p:sp>
       <p:sp>
         <p:nvSpPr>
-          <p:cNvPr id="454" name="Text"/>
+          <p:cNvPr id="458" name="Text"/>
           <p:cNvSpPr txBox="1"/>
           <p:nvPr/>
         </p:nvSpPr>
@@ -17406,7 +17525,7 @@
       </p:sp>
       <p:pic>
         <p:nvPicPr>
-          <p:cNvPr id="455" name="CVE-DB-cropped-300x235-30.jpg" descr="CVE-DB-cropped-300x235-30.jpg"/>
+          <p:cNvPr id="459" name="CVE-DB-cropped-300x235-30.jpg" descr="CVE-DB-cropped-300x235-30.jpg"/>
           <p:cNvPicPr>
             <a:picLocks noChangeAspect="1"/>
           </p:cNvPicPr>
@@ -17435,7 +17554,7 @@
       </p:pic>
       <p:pic>
         <p:nvPicPr>
-          <p:cNvPr id="456" name="cell-text-125x166.png" descr="cell-text-125x166.png"/>
+          <p:cNvPr id="460" name="cell-text-125x166.png" descr="cell-text-125x166.png"/>
           <p:cNvPicPr>
             <a:picLocks noChangeAspect="1"/>
           </p:cNvPicPr>
@@ -17464,7 +17583,7 @@
       </p:pic>
       <p:pic>
         <p:nvPicPr>
-          <p:cNvPr id="457" name="Email.png" descr="Email.png"/>
+          <p:cNvPr id="461" name="Email.png" descr="Email.png"/>
           <p:cNvPicPr>
             <a:picLocks noChangeAspect="1"/>
           </p:cNvPicPr>
@@ -17493,7 +17612,7 @@
       </p:pic>
       <p:pic>
         <p:nvPicPr>
-          <p:cNvPr id="458" name="Git-Logo-455x190.png" descr="Git-Logo-455x190.png"/>
+          <p:cNvPr id="462" name="Git-Logo-455x190.png" descr="Git-Logo-455x190.png"/>
           <p:cNvPicPr>
             <a:picLocks noChangeAspect="1"/>
           </p:cNvPicPr>
@@ -17522,7 +17641,7 @@
       </p:pic>
       <p:pic>
         <p:nvPicPr>
-          <p:cNvPr id="459" name="GitHub-281x86.png" descr="GitHub-281x86.png"/>
+          <p:cNvPr id="463" name="GitHub-281x86.png" descr="GitHub-281x86.png"/>
           <p:cNvPicPr>
             <a:picLocks noChangeAspect="1"/>
           </p:cNvPicPr>
@@ -17551,7 +17670,7 @@
       </p:pic>
       <p:sp>
         <p:nvSpPr>
-          <p:cNvPr id="460" name="South Florida Developer Conference  (SoFlo Dev Con 2024)        Saturday, May 4, 2024"/>
+          <p:cNvPr id="464" name="South Florida Developer Conference  (SoFlo Dev Con 2024)        Saturday, May 4, 2024"/>
           <p:cNvSpPr txBox="1"/>
           <p:nvPr/>
         </p:nvSpPr>
@@ -17603,7 +17722,7 @@
       </p:sp>
       <p:pic>
         <p:nvPicPr>
-          <p:cNvPr id="461" name="Microsoft-Teams4.png" descr="Microsoft-Teams4.png"/>
+          <p:cNvPr id="465" name="Microsoft-Teams4.png" descr="Microsoft-Teams4.png"/>
           <p:cNvPicPr>
             <a:picLocks noChangeAspect="1"/>
           </p:cNvPicPr>
@@ -17632,7 +17751,7 @@
       </p:pic>
       <p:pic>
         <p:nvPicPr>
-          <p:cNvPr id="462" name="Slack-bg-black2.png" descr="Slack-bg-black2.png"/>
+          <p:cNvPr id="466" name="Slack-bg-black2.png" descr="Slack-bg-black2.png"/>
           <p:cNvPicPr>
             <a:picLocks noChangeAspect="1"/>
           </p:cNvPicPr>
@@ -17661,7 +17780,7 @@
       </p:pic>
       <p:pic>
         <p:nvPicPr>
-          <p:cNvPr id="463" name="jira-software-cropped2.png" descr="jira-software-cropped2.png"/>
+          <p:cNvPr id="467" name="jira-software-cropped2.png" descr="jira-software-cropped2.png"/>
           <p:cNvPicPr>
             <a:picLocks noChangeAspect="1"/>
           </p:cNvPicPr>
@@ -17690,7 +17809,7 @@
       </p:pic>
       <p:sp>
         <p:nvSpPr>
-          <p:cNvPr id="464" name="Continuous Monitoring and NOTIFICATION"/>
+          <p:cNvPr id="468" name="Continuous Monitoring and NOTIFICATION"/>
           <p:cNvSpPr txBox="1">
             <a:spLocks noGrp="1"/>
           </p:cNvSpPr>
@@ -17771,7 +17890,7 @@
       </p:grpSpPr>
       <p:sp>
         <p:nvSpPr>
-          <p:cNvPr id="468" name="SCA SCAN for VENDOR SOFTWARE"/>
+          <p:cNvPr id="472" name="SCA SCAN for VENDOR SOFTWARE"/>
           <p:cNvSpPr txBox="1">
             <a:spLocks noGrp="1"/>
           </p:cNvSpPr>
@@ -17815,7 +17934,7 @@
       </p:sp>
       <p:sp>
         <p:nvSpPr>
-          <p:cNvPr id="469" name="Slide Number"/>
+          <p:cNvPr id="473" name="Slide Number"/>
           <p:cNvSpPr txBox="1">
             <a:spLocks noGrp="1"/>
           </p:cNvSpPr>
@@ -17862,7 +17981,7 @@
       </p:sp>
       <p:pic>
         <p:nvPicPr>
-          <p:cNvPr id="470" name="SAST-cropped-smaller-30.jpg" descr="SAST-cropped-smaller-30.jpg"/>
+          <p:cNvPr id="474" name="SAST-cropped-smaller-30.jpg" descr="SAST-cropped-smaller-30.jpg"/>
           <p:cNvPicPr>
             <a:picLocks noChangeAspect="1"/>
           </p:cNvPicPr>
@@ -17891,7 +18010,7 @@
       </p:pic>
       <p:sp>
         <p:nvSpPr>
-          <p:cNvPr id="471" name="Source: DALL·E"/>
+          <p:cNvPr id="475" name="Source: DALL·E"/>
           <p:cNvSpPr txBox="1"/>
           <p:nvPr/>
         </p:nvSpPr>
@@ -17949,7 +18068,7 @@
       </p:sp>
       <p:sp>
         <p:nvSpPr>
-          <p:cNvPr id="472" name="SBOM for VENDOR SOFTWARE RECOMMENDED"/>
+          <p:cNvPr id="476" name="SBOM for VENDOR SOFTWARE RECOMMENDED"/>
           <p:cNvSpPr txBox="1"/>
           <p:nvPr/>
         </p:nvSpPr>
@@ -17999,7 +18118,7 @@
       </p:sp>
       <p:sp>
         <p:nvSpPr>
-          <p:cNvPr id="473" name="South Florida Developer Conference  (SoFlo Dev Con 2024)        Saturday, May 4, 2024"/>
+          <p:cNvPr id="477" name="South Florida Developer Conference  (SoFlo Dev Con 2024)        Saturday, May 4, 2024"/>
           <p:cNvSpPr txBox="1"/>
           <p:nvPr/>
         </p:nvSpPr>
@@ -18088,7 +18207,7 @@
       </p:grpSpPr>
       <p:sp>
         <p:nvSpPr>
-          <p:cNvPr id="477" name="THIRD-PARTY RISK MANAGEMENT (TPRM)"/>
+          <p:cNvPr id="481" name="THIRD-PARTY RISK MANAGEMENT (TPRM)"/>
           <p:cNvSpPr txBox="1">
             <a:spLocks noGrp="1"/>
           </p:cNvSpPr>
@@ -18132,7 +18251,7 @@
       </p:sp>
       <p:sp>
         <p:nvSpPr>
-          <p:cNvPr id="478" name="Slide Number"/>
+          <p:cNvPr id="482" name="Slide Number"/>
           <p:cNvSpPr txBox="1">
             <a:spLocks noGrp="1"/>
           </p:cNvSpPr>
@@ -18179,7 +18298,7 @@
       </p:sp>
       <p:sp>
         <p:nvSpPr>
-          <p:cNvPr id="479" name="South Florida Developer Conference  (SoFlo Dev Con 2024)        Saturday, May 4, 2024"/>
+          <p:cNvPr id="483" name="South Florida Developer Conference  (SoFlo Dev Con 2024)        Saturday, May 4, 2024"/>
           <p:cNvSpPr txBox="1"/>
           <p:nvPr/>
         </p:nvSpPr>
@@ -18231,28 +18350,28 @@
       </p:sp>
       <p:grpSp>
         <p:nvGrpSpPr>
-          <p:cNvPr id="482" name="Group"/>
+          <p:cNvPr id="486" name="Group"/>
           <p:cNvGrpSpPr/>
           <p:nvPr/>
         </p:nvGrpSpPr>
         <p:grpSpPr>
           <a:xfrm>
-            <a:off x="4596943" y="3630428"/>
-            <a:ext cx="14220347" cy="5212221"/>
+            <a:off x="4381043" y="3630428"/>
+            <a:ext cx="15353487" cy="5212221"/>
             <a:chOff x="0" y="0"/>
-            <a:chExt cx="14220345" cy="5212219"/>
+            <a:chExt cx="15353486" cy="5212219"/>
           </a:xfrm>
         </p:grpSpPr>
         <p:sp>
           <p:nvSpPr>
-            <p:cNvPr id="480" name="Source: SecurityScoreCard Global Third-Party Cybersecurity Breaches Report, Feb 2024"/>
+            <p:cNvPr id="484" name="Source: SecurityScoreCard Global Third-Party Cybersecurity Breaches Report, Feb 2024"/>
             <p:cNvSpPr txBox="1"/>
             <p:nvPr/>
           </p:nvSpPr>
           <p:spPr>
             <a:xfrm>
               <a:off x="0" y="4550492"/>
-              <a:ext cx="14220346" cy="661728"/>
+              <a:ext cx="15353487" cy="661728"/>
             </a:xfrm>
             <a:prstGeom prst="rect">
               <a:avLst/>
@@ -18306,14 +18425,14 @@
         </p:sp>
         <p:sp>
           <p:nvSpPr>
-            <p:cNvPr id="481" name="Third-party breaches by industry:…"/>
+            <p:cNvPr id="485" name="Third-party breaches by industry:…"/>
             <p:cNvSpPr txBox="1"/>
             <p:nvPr/>
           </p:nvSpPr>
           <p:spPr>
             <a:xfrm>
-              <a:off x="2743233" y="0"/>
-              <a:ext cx="10266613" cy="4613096"/>
+              <a:off x="2961826" y="0"/>
+              <a:ext cx="11084702" cy="4613096"/>
             </a:xfrm>
             <a:prstGeom prst="rect">
               <a:avLst/>
@@ -18443,7 +18562,7 @@
       </p:grpSp>
       <p:sp>
         <p:nvSpPr>
-          <p:cNvPr id="483" name="Stop depending on a questionnaires for TPRM…"/>
+          <p:cNvPr id="487" name="Stop depending on a questionnaires for TPRM…"/>
           <p:cNvSpPr txBox="1"/>
           <p:nvPr/>
         </p:nvSpPr>
@@ -18515,7 +18634,7 @@
       </p:sp>
       <p:grpSp>
         <p:nvGrpSpPr>
-          <p:cNvPr id="486" name="Group"/>
+          <p:cNvPr id="490" name="Group"/>
           <p:cNvGrpSpPr/>
           <p:nvPr/>
         </p:nvGrpSpPr>
@@ -18529,7 +18648,7 @@
         </p:grpSpPr>
         <p:sp>
           <p:nvSpPr>
-            <p:cNvPr id="484" name="“98% of organizations have a relationship with a third party that has been breached.”"/>
+            <p:cNvPr id="488" name="“98% of organizations have a relationship with a third party that has been breached.”"/>
             <p:cNvSpPr txBox="1"/>
             <p:nvPr/>
           </p:nvSpPr>
@@ -18584,7 +18703,7 @@
         </p:sp>
         <p:sp>
           <p:nvSpPr>
-            <p:cNvPr id="485" name="Source: SecurityScoreCard Global Third-Party Cybersecurity Breaches Report, Feb 2024"/>
+            <p:cNvPr id="489" name="Source: SecurityScoreCard Global Third-Party Cybersecurity Breaches Report, Feb 2024"/>
             <p:cNvSpPr txBox="1"/>
             <p:nvPr/>
           </p:nvSpPr>
@@ -18694,7 +18813,7 @@
                                       <p:cBhvr>
                                         <p:cTn id="6" fill="hold"/>
                                         <p:tgtEl>
-                                          <p:spTgt spid="486"/>
+                                          <p:spTgt spid="490"/>
                                         </p:tgtEl>
                                         <p:attrNameLst>
                                           <p:attrName>style.visibility</p:attrName>
@@ -18738,7 +18857,7 @@
                                       <p:cBhvr>
                                         <p:cTn id="10" fill="hold"/>
                                         <p:tgtEl>
-                                          <p:spTgt spid="482"/>
+                                          <p:spTgt spid="486"/>
                                         </p:tgtEl>
                                         <p:attrNameLst>
                                           <p:attrName>style.visibility</p:attrName>
@@ -18782,7 +18901,7 @@
                                       <p:cBhvr>
                                         <p:cTn id="14" fill="hold"/>
                                         <p:tgtEl>
-                                          <p:spTgt spid="483"/>
+                                          <p:spTgt spid="487"/>
                                         </p:tgtEl>
                                         <p:attrNameLst>
                                           <p:attrName>style.visibility</p:attrName>
@@ -18823,9 +18942,9 @@
       </p:par>
     </p:tnLst>
     <p:bldLst>
-      <p:bldP spid="482" grpId="2" animBg="1" advAuto="0"/>
-      <p:bldP spid="483" grpId="3" animBg="1" advAuto="0"/>
-      <p:bldP spid="486" grpId="1" animBg="1" advAuto="0"/>
+      <p:bldP spid="486" grpId="2" animBg="1" advAuto="0"/>
+      <p:bldP spid="487" grpId="3" animBg="1" advAuto="0"/>
+      <p:bldP spid="490" grpId="1" animBg="1" advAuto="0"/>
     </p:bldLst>
   </p:timing>
 </p:sld>
@@ -18850,7 +18969,7 @@
       </p:grpSpPr>
       <p:sp>
         <p:nvSpPr>
-          <p:cNvPr id="488" name="Slide Number"/>
+          <p:cNvPr id="492" name="Slide Number"/>
           <p:cNvSpPr txBox="1">
             <a:spLocks noGrp="1"/>
           </p:cNvSpPr>
@@ -18897,7 +19016,7 @@
       </p:sp>
       <p:sp>
         <p:nvSpPr>
-          <p:cNvPr id="489" name="M&amp;A Use-case"/>
+          <p:cNvPr id="493" name="M&amp;A Use-case"/>
           <p:cNvSpPr txBox="1">
             <a:spLocks noGrp="1"/>
           </p:cNvSpPr>
@@ -18941,7 +19060,7 @@
       </p:sp>
       <p:sp>
         <p:nvSpPr>
-          <p:cNvPr id="490" name="Searching for code vulnerabilities…"/>
+          <p:cNvPr id="494" name="Searching for code vulnerabilities…"/>
           <p:cNvSpPr txBox="1">
             <a:spLocks noGrp="1"/>
           </p:cNvSpPr>
@@ -19061,7 +19180,7 @@
       </p:sp>
       <p:sp>
         <p:nvSpPr>
-          <p:cNvPr id="491" name="South Florida Developer Conference  (SoFlo Dev Con 2024)        Saturday, May 4, 2024"/>
+          <p:cNvPr id="495" name="South Florida Developer Conference  (SoFlo Dev Con 2024)        Saturday, May 4, 2024"/>
           <p:cNvSpPr txBox="1"/>
           <p:nvPr/>
         </p:nvSpPr>
@@ -19161,7 +19280,7 @@
                                       <p:cBhvr>
                                         <p:cTn id="6" fill="hold"/>
                                         <p:tgtEl>
-                                          <p:spTgt spid="490">
+                                          <p:spTgt spid="494">
                                             <p:bg/>
                                           </p:spTgt>
                                         </p:tgtEl>
@@ -19189,7 +19308,7 @@
                                       <p:cBhvr>
                                         <p:cTn id="8" fill="hold"/>
                                         <p:tgtEl>
-                                          <p:spTgt spid="490">
+                                          <p:spTgt spid="494">
                                             <p:txEl>
                                               <p:pRg st="0" end="0"/>
                                             </p:txEl>
@@ -19237,7 +19356,7 @@
                                       <p:cBhvr>
                                         <p:cTn id="12" fill="hold"/>
                                         <p:tgtEl>
-                                          <p:spTgt spid="490">
+                                          <p:spTgt spid="494">
                                             <p:txEl>
                                               <p:pRg st="1" end="1"/>
                                             </p:txEl>
@@ -19285,7 +19404,7 @@
                                       <p:cBhvr>
                                         <p:cTn id="16" fill="hold"/>
                                         <p:tgtEl>
-                                          <p:spTgt spid="490">
+                                          <p:spTgt spid="494">
                                             <p:txEl>
                                               <p:pRg st="2" end="2"/>
                                             </p:txEl>
@@ -19333,7 +19452,7 @@
                                       <p:cBhvr>
                                         <p:cTn id="20" fill="hold"/>
                                         <p:tgtEl>
-                                          <p:spTgt spid="490">
+                                          <p:spTgt spid="494">
                                             <p:txEl>
                                               <p:pRg st="3" end="3"/>
                                             </p:txEl>
@@ -19381,7 +19500,7 @@
                                       <p:cBhvr>
                                         <p:cTn id="24" fill="hold"/>
                                         <p:tgtEl>
-                                          <p:spTgt spid="490">
+                                          <p:spTgt spid="494">
                                             <p:txEl>
                                               <p:pRg st="4" end="4"/>
                                             </p:txEl>
@@ -19429,7 +19548,7 @@
                                       <p:cBhvr>
                                         <p:cTn id="28" fill="hold"/>
                                         <p:tgtEl>
-                                          <p:spTgt spid="490">
+                                          <p:spTgt spid="494">
                                             <p:txEl>
                                               <p:pRg st="5" end="5"/>
                                             </p:txEl>
@@ -19474,7 +19593,7 @@
       </p:par>
     </p:tnLst>
     <p:bldLst>
-      <p:bldP spid="490" grpId="1" build="p" bldLvl="5" animBg="1" advAuto="0"/>
+      <p:bldP spid="494" grpId="1" build="p" bldLvl="5" animBg="1" advAuto="0"/>
     </p:bldLst>
   </p:timing>
 </p:sld>
@@ -19499,7 +19618,7 @@
       </p:grpSpPr>
       <p:sp>
         <p:nvSpPr>
-          <p:cNvPr id="495" name="Slide Number"/>
+          <p:cNvPr id="499" name="Slide Number"/>
           <p:cNvSpPr txBox="1">
             <a:spLocks noGrp="1"/>
           </p:cNvSpPr>
@@ -19546,7 +19665,7 @@
       </p:sp>
       <p:sp>
         <p:nvSpPr>
-          <p:cNvPr id="496" name="AI Hallucinations"/>
+          <p:cNvPr id="500" name="AI Hallucinations"/>
           <p:cNvSpPr txBox="1">
             <a:spLocks noGrp="1"/>
           </p:cNvSpPr>
@@ -19592,7 +19711,7 @@
       </p:sp>
       <p:sp>
         <p:nvSpPr>
-          <p:cNvPr id="497" name="Source: https://www.theregister.com/2024/03/28/ai_bots_hallucinate_software_packages/"/>
+          <p:cNvPr id="501" name="Source: https://www.theregister.com/2024/03/28/ai_bots_hallucinate_software_packages/"/>
           <p:cNvSpPr txBox="1"/>
           <p:nvPr/>
         </p:nvSpPr>
@@ -19650,7 +19769,7 @@
       </p:sp>
       <p:pic>
         <p:nvPicPr>
-          <p:cNvPr id="498" name="AI-Hallucination-30.jpg" descr="AI-Hallucination-30.jpg"/>
+          <p:cNvPr id="502" name="AI-Hallucination-30.jpg" descr="AI-Hallucination-30.jpg"/>
           <p:cNvPicPr>
             <a:picLocks noChangeAspect="1"/>
           </p:cNvPicPr>
@@ -19679,7 +19798,7 @@
       </p:pic>
       <p:sp>
         <p:nvSpPr>
-          <p:cNvPr id="499" name="South Florida Developer Conference  (SoFlo Dev Con 2024)        Saturday, May 4, 2024"/>
+          <p:cNvPr id="503" name="South Florida Developer Conference  (SoFlo Dev Con 2024)        Saturday, May 4, 2024"/>
           <p:cNvSpPr txBox="1"/>
           <p:nvPr/>
         </p:nvSpPr>
@@ -19768,7 +19887,7 @@
       </p:grpSpPr>
       <p:sp>
         <p:nvSpPr>
-          <p:cNvPr id="501" name="SCA TOOLS"/>
+          <p:cNvPr id="505" name="SCA TOOLS"/>
           <p:cNvSpPr txBox="1">
             <a:spLocks noGrp="1"/>
           </p:cNvSpPr>
@@ -19812,7 +19931,7 @@
       </p:sp>
       <p:sp>
         <p:nvSpPr>
-          <p:cNvPr id="502" name="Slide Number"/>
+          <p:cNvPr id="506" name="Slide Number"/>
           <p:cNvSpPr txBox="1">
             <a:spLocks noGrp="1"/>
           </p:cNvSpPr>
@@ -19859,7 +19978,7 @@
       </p:sp>
       <p:sp>
         <p:nvSpPr>
-          <p:cNvPr id="503" name="South Florida Developer Conference  (SoFlo Dev Con 2024)        Saturday, May 4, 2024"/>
+          <p:cNvPr id="507" name="South Florida Developer Conference  (SoFlo Dev Con 2024)        Saturday, May 4, 2024"/>
           <p:cNvSpPr txBox="1"/>
           <p:nvPr/>
         </p:nvSpPr>
@@ -19948,7 +20067,7 @@
       </p:grpSpPr>
       <p:sp>
         <p:nvSpPr>
-          <p:cNvPr id="505" name="SCA IDE PlugINS"/>
+          <p:cNvPr id="509" name="SCA IDE PlugINS"/>
           <p:cNvSpPr txBox="1">
             <a:spLocks noGrp="1"/>
           </p:cNvSpPr>
@@ -19992,7 +20111,7 @@
       </p:sp>
       <p:sp>
         <p:nvSpPr>
-          <p:cNvPr id="506" name="Slide Number"/>
+          <p:cNvPr id="510" name="Slide Number"/>
           <p:cNvSpPr txBox="1">
             <a:spLocks noGrp="1"/>
           </p:cNvSpPr>
@@ -20039,7 +20158,7 @@
       </p:sp>
       <p:sp>
         <p:nvSpPr>
-          <p:cNvPr id="507" name="Source: https://youtu.be/6cxi96CJB14"/>
+          <p:cNvPr id="511" name="Source: https://youtu.be/6cxi96CJB14"/>
           <p:cNvSpPr txBox="1"/>
           <p:nvPr/>
         </p:nvSpPr>
@@ -20097,7 +20216,7 @@
       </p:sp>
       <p:pic>
         <p:nvPicPr>
-          <p:cNvPr id="508" name="videoframe_166389-960x540-50.jpg" descr="videoframe_166389-960x540-50.jpg"/>
+          <p:cNvPr id="512" name="videoframe_166389-960x540-50.jpg" descr="videoframe_166389-960x540-50.jpg"/>
           <p:cNvPicPr>
             <a:picLocks noChangeAspect="1"/>
           </p:cNvPicPr>
@@ -20126,7 +20245,7 @@
       </p:pic>
       <p:sp>
         <p:nvSpPr>
-          <p:cNvPr id="509" name="South Florida Developer Conference  (SoFlo Dev Con 2024)        Saturday, May 4, 2024"/>
+          <p:cNvPr id="513" name="South Florida Developer Conference  (SoFlo Dev Con 2024)        Saturday, May 4, 2024"/>
           <p:cNvSpPr txBox="1"/>
           <p:nvPr/>
         </p:nvSpPr>
@@ -20215,7 +20334,7 @@
       </p:grpSpPr>
       <p:sp>
         <p:nvSpPr>
-          <p:cNvPr id="191" name="INTRODUCTION"/>
+          <p:cNvPr id="195" name="INTRODUCTION"/>
           <p:cNvSpPr txBox="1">
             <a:spLocks noGrp="1"/>
           </p:cNvSpPr>
@@ -20259,7 +20378,7 @@
       </p:sp>
       <p:sp>
         <p:nvSpPr>
-          <p:cNvPr id="192" name="Slide Number"/>
+          <p:cNvPr id="196" name="Slide Number"/>
           <p:cNvSpPr txBox="1">
             <a:spLocks noGrp="1"/>
           </p:cNvSpPr>
@@ -20306,7 +20425,7 @@
       </p:sp>
       <p:sp>
         <p:nvSpPr>
-          <p:cNvPr id="193" name="Market forces are driving companies to develop secure software faster to gain a competitive advantage.…"/>
+          <p:cNvPr id="197" name="Market forces are driving companies to develop secure software faster to gain a competitive advantage.…"/>
           <p:cNvSpPr txBox="1">
             <a:spLocks noGrp="1"/>
           </p:cNvSpPr>
@@ -20378,7 +20497,7 @@
       </p:sp>
       <p:sp>
         <p:nvSpPr>
-          <p:cNvPr id="194" name="South Florida Developer Conference  (SoFlo Dev Con 2024)        Saturday, May 4, 2024"/>
+          <p:cNvPr id="198" name="South Florida Developer Conference  (SoFlo Dev Con 2024)        Saturday, May 4, 2024"/>
           <p:cNvSpPr txBox="1"/>
           <p:nvPr/>
         </p:nvSpPr>
@@ -20478,7 +20597,7 @@
                                       <p:cBhvr>
                                         <p:cTn id="6" fill="hold"/>
                                         <p:tgtEl>
-                                          <p:spTgt spid="193">
+                                          <p:spTgt spid="197">
                                             <p:bg/>
                                           </p:spTgt>
                                         </p:tgtEl>
@@ -20506,7 +20625,7 @@
                                       <p:cBhvr>
                                         <p:cTn id="8" fill="hold"/>
                                         <p:tgtEl>
-                                          <p:spTgt spid="193">
+                                          <p:spTgt spid="197">
                                             <p:txEl>
                                               <p:pRg st="0" end="0"/>
                                             </p:txEl>
@@ -20554,7 +20673,7 @@
                                       <p:cBhvr>
                                         <p:cTn id="12" fill="hold"/>
                                         <p:tgtEl>
-                                          <p:spTgt spid="193">
+                                          <p:spTgt spid="197">
                                             <p:txEl>
                                               <p:pRg st="1" end="1"/>
                                             </p:txEl>
@@ -20602,7 +20721,7 @@
                                       <p:cBhvr>
                                         <p:cTn id="16" fill="hold"/>
                                         <p:tgtEl>
-                                          <p:spTgt spid="193">
+                                          <p:spTgt spid="197">
                                             <p:txEl>
                                               <p:pRg st="2" end="2"/>
                                             </p:txEl>
@@ -20647,7 +20766,7 @@
       </p:par>
     </p:tnLst>
     <p:bldLst>
-      <p:bldP spid="193" grpId="1" build="p" bldLvl="5" animBg="1" advAuto="0"/>
+      <p:bldP spid="197" grpId="1" build="p" bldLvl="5" animBg="1" advAuto="0"/>
     </p:bldLst>
   </p:timing>
 </p:sld>
@@ -20672,7 +20791,7 @@
       </p:grpSpPr>
       <p:sp>
         <p:nvSpPr>
-          <p:cNvPr id="513" name="SCA IDE PlugINS"/>
+          <p:cNvPr id="517" name="SCA IDE PlugINS"/>
           <p:cNvSpPr txBox="1">
             <a:spLocks noGrp="1"/>
           </p:cNvSpPr>
@@ -20716,7 +20835,7 @@
       </p:sp>
       <p:sp>
         <p:nvSpPr>
-          <p:cNvPr id="514" name="Slide Number"/>
+          <p:cNvPr id="518" name="Slide Number"/>
           <p:cNvSpPr txBox="1">
             <a:spLocks noGrp="1"/>
           </p:cNvSpPr>
@@ -20763,7 +20882,7 @@
       </p:sp>
       <p:sp>
         <p:nvSpPr>
-          <p:cNvPr id="515" name="Source: https://youtu.be/W9BHyXYw3vQ"/>
+          <p:cNvPr id="519" name="Source: https://youtu.be/W9BHyXYw3vQ"/>
           <p:cNvSpPr txBox="1"/>
           <p:nvPr/>
         </p:nvSpPr>
@@ -20821,7 +20940,7 @@
       </p:sp>
       <p:pic>
         <p:nvPicPr>
-          <p:cNvPr id="516" name="videoframe_59878-1273x750-50.jpg" descr="videoframe_59878-1273x750-50.jpg"/>
+          <p:cNvPr id="520" name="videoframe_59878-1273x750-50.jpg" descr="videoframe_59878-1273x750-50.jpg"/>
           <p:cNvPicPr>
             <a:picLocks noChangeAspect="1"/>
           </p:cNvPicPr>
@@ -20850,7 +20969,7 @@
       </p:pic>
       <p:sp>
         <p:nvSpPr>
-          <p:cNvPr id="517" name="South Florida Developer Conference  (SoFlo Dev Con 2024)        Saturday, May 4, 2024"/>
+          <p:cNvPr id="521" name="South Florida Developer Conference  (SoFlo Dev Con 2024)        Saturday, May 4, 2024"/>
           <p:cNvSpPr txBox="1"/>
           <p:nvPr/>
         </p:nvSpPr>
@@ -20939,7 +21058,7 @@
       </p:grpSpPr>
       <p:sp>
         <p:nvSpPr>
-          <p:cNvPr id="521" name="Slide Number"/>
+          <p:cNvPr id="525" name="Slide Number"/>
           <p:cNvSpPr txBox="1">
             <a:spLocks noGrp="1"/>
           </p:cNvSpPr>
@@ -20986,7 +21105,7 @@
       </p:sp>
       <p:sp>
         <p:nvSpPr>
-          <p:cNvPr id="522" name="Source: https://plugins.jenkins.io/dependency-check-jenkins-plugin/"/>
+          <p:cNvPr id="526" name="Source: https://plugins.jenkins.io/dependency-check-jenkins-plugin/"/>
           <p:cNvSpPr txBox="1"/>
           <p:nvPr/>
         </p:nvSpPr>
@@ -21044,7 +21163,7 @@
       </p:sp>
       <p:sp>
         <p:nvSpPr>
-          <p:cNvPr id="523" name="DEPendency CHECK"/>
+          <p:cNvPr id="527" name="DEPendency CHECK"/>
           <p:cNvSpPr txBox="1">
             <a:spLocks noGrp="1"/>
           </p:cNvSpPr>
@@ -21088,7 +21207,7 @@
       </p:sp>
       <p:pic>
         <p:nvPicPr>
-          <p:cNvPr id="524" name="publisher-trend-hover-526x250.png" descr="publisher-trend-hover-526x250.png"/>
+          <p:cNvPr id="528" name="publisher-trend-hover-526x250.png" descr="publisher-trend-hover-526x250.png"/>
           <p:cNvPicPr>
             <a:picLocks noChangeAspect="1"/>
           </p:cNvPicPr>
@@ -21117,7 +21236,7 @@
       </p:pic>
       <p:pic>
         <p:nvPicPr>
-          <p:cNvPr id="525" name="publisher-results-expanded-779x456.png" descr="publisher-results-expanded-779x456.png"/>
+          <p:cNvPr id="529" name="publisher-results-expanded-779x456.png" descr="publisher-results-expanded-779x456.png"/>
           <p:cNvPicPr>
             <a:picLocks noChangeAspect="1"/>
           </p:cNvPicPr>
@@ -21146,7 +21265,7 @@
       </p:pic>
       <p:sp>
         <p:nvSpPr>
-          <p:cNvPr id="526" name="South Florida Developer Conference  (SoFlo Dev Con 2024)        Saturday, May 4, 2024"/>
+          <p:cNvPr id="530" name="South Florida Developer Conference  (SoFlo Dev Con 2024)        Saturday, May 4, 2024"/>
           <p:cNvSpPr txBox="1"/>
           <p:nvPr/>
         </p:nvSpPr>
@@ -21235,7 +21354,7 @@
       </p:grpSpPr>
       <p:pic>
         <p:nvPicPr>
-          <p:cNvPr id="530" name="Death_star1-100x100.png" descr="Death_star1-100x100.png"/>
+          <p:cNvPr id="534" name="Death_star1-100x100.png" descr="Death_star1-100x100.png"/>
           <p:cNvPicPr>
             <a:picLocks noChangeAspect="1"/>
           </p:cNvPicPr>
@@ -21267,7 +21386,7 @@
       </p:pic>
       <p:sp>
         <p:nvSpPr>
-          <p:cNvPr id="531" name="Slide Number"/>
+          <p:cNvPr id="535" name="Slide Number"/>
           <p:cNvSpPr txBox="1">
             <a:spLocks noGrp="1"/>
           </p:cNvSpPr>
@@ -21314,7 +21433,7 @@
       </p:sp>
       <p:sp>
         <p:nvSpPr>
-          <p:cNvPr id="532" name="Source: https://www.dependencytrack.org/"/>
+          <p:cNvPr id="536" name="Source: https://www.dependencytrack.org/"/>
           <p:cNvSpPr txBox="1"/>
           <p:nvPr/>
         </p:nvSpPr>
@@ -21372,7 +21491,7 @@
       </p:sp>
       <p:sp>
         <p:nvSpPr>
-          <p:cNvPr id="533" name="DEPendency TRACK"/>
+          <p:cNvPr id="537" name="DEPendency TRACK"/>
           <p:cNvSpPr txBox="1">
             <a:spLocks noGrp="1"/>
           </p:cNvSpPr>
@@ -21416,7 +21535,7 @@
       </p:sp>
       <p:pic>
         <p:nvPicPr>
-          <p:cNvPr id="534" name="dependency-track-902x534-50.jpg" descr="dependency-track-902x534-50.jpg"/>
+          <p:cNvPr id="538" name="dependency-track-902x534-50.jpg" descr="dependency-track-902x534-50.jpg"/>
           <p:cNvPicPr>
             <a:picLocks noChangeAspect="1"/>
           </p:cNvPicPr>
@@ -21445,7 +21564,7 @@
       </p:pic>
       <p:sp>
         <p:nvSpPr>
-          <p:cNvPr id="535" name="South Florida Developer Conference  (SoFlo Dev Con 2024)        Saturday, May 4, 2024"/>
+          <p:cNvPr id="539" name="South Florida Developer Conference  (SoFlo Dev Con 2024)        Saturday, May 4, 2024"/>
           <p:cNvSpPr txBox="1"/>
           <p:nvPr/>
         </p:nvSpPr>
@@ -21534,7 +21653,7 @@
       </p:grpSpPr>
       <p:sp>
         <p:nvSpPr>
-          <p:cNvPr id="539" name="Slide Number"/>
+          <p:cNvPr id="543" name="Slide Number"/>
           <p:cNvSpPr txBox="1">
             <a:spLocks noGrp="1"/>
           </p:cNvSpPr>
@@ -21581,7 +21700,7 @@
       </p:sp>
       <p:sp>
         <p:nvSpPr>
-          <p:cNvPr id="540" name="DEPendency TRACK DEMO OVERVIEW"/>
+          <p:cNvPr id="544" name="DEPendency TRACK DEMO OVERVIEW"/>
           <p:cNvSpPr txBox="1">
             <a:spLocks noGrp="1"/>
           </p:cNvSpPr>
@@ -21625,7 +21744,7 @@
       </p:sp>
       <p:sp>
         <p:nvSpPr>
-          <p:cNvPr id="541" name="South Florida Developer Conference  (SoFlo Dev Con 2024)        Saturday, May 4, 2024"/>
+          <p:cNvPr id="545" name="South Florida Developer Conference  (SoFlo Dev Con 2024)        Saturday, May 4, 2024"/>
           <p:cNvSpPr txBox="1"/>
           <p:nvPr/>
         </p:nvSpPr>
@@ -21677,7 +21796,7 @@
       </p:sp>
       <p:sp>
         <p:nvSpPr>
-          <p:cNvPr id="542" name="Step 1: Download application code from GitHub…"/>
+          <p:cNvPr id="546" name="Step 1: Download application code from GitHub…"/>
           <p:cNvSpPr txBox="1">
             <a:spLocks noGrp="1"/>
           </p:cNvSpPr>
@@ -21825,7 +21944,7 @@
                                       <p:cBhvr>
                                         <p:cTn id="6" fill="hold"/>
                                         <p:tgtEl>
-                                          <p:spTgt spid="542"/>
+                                          <p:spTgt spid="546"/>
                                         </p:tgtEl>
                                         <p:attrNameLst>
                                           <p:attrName>style.visibility</p:attrName>
@@ -21866,7 +21985,7 @@
       </p:par>
     </p:tnLst>
     <p:bldLst>
-      <p:bldP spid="542" grpId="1" animBg="1" advAuto="0"/>
+      <p:bldP spid="546" grpId="1" animBg="1" advAuto="0"/>
     </p:bldLst>
   </p:timing>
 </p:sld>
@@ -21891,7 +22010,7 @@
       </p:grpSpPr>
       <p:sp>
         <p:nvSpPr>
-          <p:cNvPr id="546" name="Slide Number"/>
+          <p:cNvPr id="550" name="Slide Number"/>
           <p:cNvSpPr txBox="1">
             <a:spLocks noGrp="1"/>
           </p:cNvSpPr>
@@ -21938,7 +22057,7 @@
       </p:sp>
       <p:sp>
         <p:nvSpPr>
-          <p:cNvPr id="547" name="Running DEPendency TRACK"/>
+          <p:cNvPr id="551" name="Running DEPendency TRACK"/>
           <p:cNvSpPr txBox="1">
             <a:spLocks noGrp="1"/>
           </p:cNvSpPr>
@@ -21982,7 +22101,7 @@
       </p:sp>
       <p:sp>
         <p:nvSpPr>
-          <p:cNvPr id="548" name="South Florida Developer Conference  (SoFlo Dev Con 2024)        Saturday, May 4, 2024"/>
+          <p:cNvPr id="552" name="South Florida Developer Conference  (SoFlo Dev Con 2024)        Saturday, May 4, 2024"/>
           <p:cNvSpPr txBox="1"/>
           <p:nvPr/>
         </p:nvSpPr>
@@ -22034,7 +22153,7 @@
       </p:sp>
       <p:sp>
         <p:nvSpPr>
-          <p:cNvPr id="549" name="Step 1: Requirements…"/>
+          <p:cNvPr id="553" name="Step 1: Requirements…"/>
           <p:cNvSpPr txBox="1">
             <a:spLocks noGrp="1"/>
           </p:cNvSpPr>
@@ -22315,7 +22434,7 @@
                                       <p:cBhvr>
                                         <p:cTn id="6" fill="hold"/>
                                         <p:tgtEl>
-                                          <p:spTgt spid="549"/>
+                                          <p:spTgt spid="553"/>
                                         </p:tgtEl>
                                         <p:attrNameLst>
                                           <p:attrName>style.visibility</p:attrName>
@@ -22356,7 +22475,7 @@
       </p:par>
     </p:tnLst>
     <p:bldLst>
-      <p:bldP spid="549" grpId="1" animBg="1" advAuto="0"/>
+      <p:bldP spid="553" grpId="1" animBg="1" advAuto="0"/>
     </p:bldLst>
   </p:timing>
 </p:sld>
@@ -22381,7 +22500,7 @@
       </p:grpSpPr>
       <p:sp>
         <p:nvSpPr>
-          <p:cNvPr id="551" name="Slide Number"/>
+          <p:cNvPr id="555" name="Slide Number"/>
           <p:cNvSpPr txBox="1">
             <a:spLocks noGrp="1"/>
           </p:cNvSpPr>
@@ -22428,7 +22547,7 @@
       </p:sp>
       <p:sp>
         <p:nvSpPr>
-          <p:cNvPr id="552" name="WhAT HAPPENS When DEPendency TRACK…"/>
+          <p:cNvPr id="556" name="WhAT HAPPENS When DEPendency TRACK…"/>
           <p:cNvSpPr txBox="1">
             <a:spLocks noGrp="1"/>
           </p:cNvSpPr>
@@ -22490,7 +22609,7 @@
       </p:sp>
       <p:sp>
         <p:nvSpPr>
-          <p:cNvPr id="553" name="South Florida Developer Conference  (SoFlo Dev Con 2024)        Saturday, May 4, 2024"/>
+          <p:cNvPr id="557" name="South Florida Developer Conference  (SoFlo Dev Con 2024)        Saturday, May 4, 2024"/>
           <p:cNvSpPr txBox="1"/>
           <p:nvPr/>
         </p:nvSpPr>
@@ -22542,7 +22661,7 @@
       </p:sp>
       <p:sp>
         <p:nvSpPr>
-          <p:cNvPr id="554" name="Downloading the Docker compose file…"/>
+          <p:cNvPr id="558" name="Downloading the Docker compose file…"/>
           <p:cNvSpPr txBox="1">
             <a:spLocks noGrp="1"/>
           </p:cNvSpPr>
@@ -22766,7 +22885,7 @@
                                       <p:cBhvr>
                                         <p:cTn id="6" fill="hold"/>
                                         <p:tgtEl>
-                                          <p:spTgt spid="554"/>
+                                          <p:spTgt spid="558"/>
                                         </p:tgtEl>
                                         <p:attrNameLst>
                                           <p:attrName>style.visibility</p:attrName>
@@ -22807,7 +22926,7 @@
       </p:par>
     </p:tnLst>
     <p:bldLst>
-      <p:bldP spid="554" grpId="1" animBg="1" advAuto="0"/>
+      <p:bldP spid="558" grpId="1" animBg="1" advAuto="0"/>
     </p:bldLst>
   </p:timing>
 </p:sld>
@@ -22832,7 +22951,7 @@
       </p:grpSpPr>
       <p:sp>
         <p:nvSpPr>
-          <p:cNvPr id="556" name="Slide Number"/>
+          <p:cNvPr id="560" name="Slide Number"/>
           <p:cNvSpPr txBox="1">
             <a:spLocks noGrp="1"/>
           </p:cNvSpPr>
@@ -22879,7 +22998,7 @@
       </p:sp>
       <p:sp>
         <p:nvSpPr>
-          <p:cNvPr id="557" name="DEPendency TRACK API SETUP"/>
+          <p:cNvPr id="561" name="DEPendency TRACK API SETUP"/>
           <p:cNvSpPr txBox="1">
             <a:spLocks noGrp="1"/>
           </p:cNvSpPr>
@@ -22923,7 +23042,7 @@
       </p:sp>
       <p:sp>
         <p:nvSpPr>
-          <p:cNvPr id="558" name="South Florida Developer Conference  (SoFlo Dev Con 2024)        Saturday, May 4, 2024"/>
+          <p:cNvPr id="562" name="South Florida Developer Conference  (SoFlo Dev Con 2024)        Saturday, May 4, 2024"/>
           <p:cNvSpPr txBox="1"/>
           <p:nvPr/>
         </p:nvSpPr>
@@ -22975,7 +23094,7 @@
       </p:sp>
       <p:sp>
         <p:nvSpPr>
-          <p:cNvPr id="559" name="Step 1: Login with user/password: admin/admin…"/>
+          <p:cNvPr id="563" name="Step 1: Login with user/password: admin/admin…"/>
           <p:cNvSpPr txBox="1">
             <a:spLocks noGrp="1"/>
           </p:cNvSpPr>
@@ -23162,7 +23281,7 @@
       </p:sp>
       <p:sp>
         <p:nvSpPr>
-          <p:cNvPr id="560" name="Note: UI: localhost:8080 / API: localhost:8081"/>
+          <p:cNvPr id="564" name="Note: UI: localhost:8080 / API: localhost:8081"/>
           <p:cNvSpPr txBox="1"/>
           <p:nvPr/>
         </p:nvSpPr>
@@ -23264,7 +23383,7 @@
                                       <p:cBhvr>
                                         <p:cTn id="6" fill="hold"/>
                                         <p:tgtEl>
-                                          <p:spTgt spid="559"/>
+                                          <p:spTgt spid="563"/>
                                         </p:tgtEl>
                                         <p:attrNameLst>
                                           <p:attrName>style.visibility</p:attrName>
@@ -23308,7 +23427,7 @@
                                       <p:cBhvr>
                                         <p:cTn id="10" fill="hold"/>
                                         <p:tgtEl>
-                                          <p:spTgt spid="560">
+                                          <p:spTgt spid="564">
                                             <p:bg/>
                                           </p:spTgt>
                                         </p:tgtEl>
@@ -23336,7 +23455,7 @@
                                       <p:cBhvr>
                                         <p:cTn id="12" fill="hold"/>
                                         <p:tgtEl>
-                                          <p:spTgt spid="560">
+                                          <p:spTgt spid="564">
                                             <p:txEl>
                                               <p:pRg st="0" end="0"/>
                                             </p:txEl>
@@ -23381,8 +23500,8 @@
       </p:par>
     </p:tnLst>
     <p:bldLst>
-      <p:bldP spid="559" grpId="1" animBg="1" advAuto="0"/>
-      <p:bldP spid="560" grpId="2" build="p" bldLvl="5" animBg="1" advAuto="0"/>
+      <p:bldP spid="563" grpId="1" animBg="1" advAuto="0"/>
+      <p:bldP spid="564" grpId="2" build="p" bldLvl="5" animBg="1" advAuto="0"/>
     </p:bldLst>
   </p:timing>
 </p:sld>
@@ -23407,7 +23526,7 @@
       </p:grpSpPr>
       <p:sp>
         <p:nvSpPr>
-          <p:cNvPr id="562" name="Slide Number"/>
+          <p:cNvPr id="566" name="Slide Number"/>
           <p:cNvSpPr txBox="1">
             <a:spLocks noGrp="1"/>
           </p:cNvSpPr>
@@ -23454,7 +23573,7 @@
       </p:sp>
       <p:sp>
         <p:nvSpPr>
-          <p:cNvPr id="563" name="DEPendency TRACK API Retrieve API KEY"/>
+          <p:cNvPr id="567" name="DEPendency TRACK API Retrieve API KEY"/>
           <p:cNvSpPr txBox="1">
             <a:spLocks noGrp="1"/>
           </p:cNvSpPr>
@@ -23498,7 +23617,7 @@
       </p:sp>
       <p:sp>
         <p:nvSpPr>
-          <p:cNvPr id="564" name="South Florida Developer Conference  (SoFlo Dev Con 2024)        Saturday, May 4, 2024"/>
+          <p:cNvPr id="568" name="South Florida Developer Conference  (SoFlo Dev Con 2024)        Saturday, May 4, 2024"/>
           <p:cNvSpPr txBox="1"/>
           <p:nvPr/>
         </p:nvSpPr>
@@ -23550,7 +23669,7 @@
       </p:sp>
       <p:pic>
         <p:nvPicPr>
-          <p:cNvPr id="565" name="dependency-track-API-Key-902x567-50.jpg" descr="dependency-track-API-Key-902x567-50.jpg"/>
+          <p:cNvPr id="569" name="dependency-track-API-Key-902x567-50.jpg" descr="dependency-track-API-Key-902x567-50.jpg"/>
           <p:cNvPicPr>
             <a:picLocks noChangeAspect="1"/>
           </p:cNvPicPr>
@@ -23579,7 +23698,7 @@
       </p:pic>
       <p:sp>
         <p:nvSpPr>
-          <p:cNvPr id="566" name="Note: Add “PROJECT_CREATION_UPLOAD” permission"/>
+          <p:cNvPr id="570" name="Note: Add “PROJECT_CREATION_UPLOAD” permission"/>
           <p:cNvSpPr txBox="1"/>
           <p:nvPr/>
         </p:nvSpPr>
@@ -23681,7 +23800,7 @@
                                       <p:cBhvr>
                                         <p:cTn id="6" fill="hold"/>
                                         <p:tgtEl>
-                                          <p:spTgt spid="566"/>
+                                          <p:spTgt spid="570"/>
                                         </p:tgtEl>
                                         <p:attrNameLst>
                                           <p:attrName>style.visibility</p:attrName>
@@ -23722,7 +23841,7 @@
       </p:par>
     </p:tnLst>
     <p:bldLst>
-      <p:bldP spid="566" grpId="1" animBg="1" advAuto="0"/>
+      <p:bldP spid="570" grpId="1" animBg="1" advAuto="0"/>
     </p:bldLst>
   </p:timing>
 </p:sld>
@@ -23747,7 +23866,7 @@
       </p:grpSpPr>
       <p:sp>
         <p:nvSpPr>
-          <p:cNvPr id="568" name="Slide Number"/>
+          <p:cNvPr id="572" name="Slide Number"/>
           <p:cNvSpPr txBox="1">
             <a:spLocks noGrp="1"/>
           </p:cNvSpPr>
@@ -23794,7 +23913,7 @@
       </p:sp>
       <p:sp>
         <p:nvSpPr>
-          <p:cNvPr id="569" name="CrEATING THE SBOM"/>
+          <p:cNvPr id="573" name="CrEATING THE SBOM"/>
           <p:cNvSpPr txBox="1">
             <a:spLocks noGrp="1"/>
           </p:cNvSpPr>
@@ -23838,7 +23957,7 @@
       </p:sp>
       <p:sp>
         <p:nvSpPr>
-          <p:cNvPr id="570" name="South Florida Developer Conference  (SoFlo Dev Con 2024)        Saturday, May 4, 2024"/>
+          <p:cNvPr id="574" name="South Florida Developer Conference  (SoFlo Dev Con 2024)        Saturday, May 4, 2024"/>
           <p:cNvSpPr txBox="1"/>
           <p:nvPr/>
         </p:nvSpPr>
@@ -23890,7 +24009,7 @@
       </p:sp>
       <p:sp>
         <p:nvSpPr>
-          <p:cNvPr id="571" name="Why use cdxgen?…"/>
+          <p:cNvPr id="575" name="Why use cdxgen?…"/>
           <p:cNvSpPr txBox="1">
             <a:spLocks noGrp="1"/>
           </p:cNvSpPr>
@@ -24055,7 +24174,7 @@
       </p:sp>
       <p:sp>
         <p:nvSpPr>
-          <p:cNvPr id="572" name="Chose random Java application…"/>
+          <p:cNvPr id="576" name="Chose random Java application…"/>
           <p:cNvSpPr txBox="1"/>
           <p:nvPr/>
         </p:nvSpPr>
@@ -24198,7 +24317,7 @@
                                       <p:cBhvr>
                                         <p:cTn id="6" fill="hold"/>
                                         <p:tgtEl>
-                                          <p:spTgt spid="571"/>
+                                          <p:spTgt spid="575"/>
                                         </p:tgtEl>
                                         <p:attrNameLst>
                                           <p:attrName>style.visibility</p:attrName>
@@ -24242,7 +24361,7 @@
                                       <p:cBhvr>
                                         <p:cTn id="10" fill="hold"/>
                                         <p:tgtEl>
-                                          <p:spTgt spid="572"/>
+                                          <p:spTgt spid="576"/>
                                         </p:tgtEl>
                                         <p:attrNameLst>
                                           <p:attrName>style.visibility</p:attrName>
@@ -24283,8 +24402,8 @@
       </p:par>
     </p:tnLst>
     <p:bldLst>
-      <p:bldP spid="571" grpId="1" animBg="1" advAuto="0"/>
-      <p:bldP spid="572" grpId="2" animBg="1" advAuto="0"/>
+      <p:bldP spid="575" grpId="1" animBg="1" advAuto="0"/>
+      <p:bldP spid="576" grpId="2" animBg="1" advAuto="0"/>
     </p:bldLst>
   </p:timing>
 </p:sld>
@@ -24309,7 +24428,7 @@
       </p:grpSpPr>
       <p:sp>
         <p:nvSpPr>
-          <p:cNvPr id="574" name="Slide Number"/>
+          <p:cNvPr id="578" name="Slide Number"/>
           <p:cNvSpPr txBox="1">
             <a:spLocks noGrp="1"/>
           </p:cNvSpPr>
@@ -24356,7 +24475,7 @@
       </p:sp>
       <p:sp>
         <p:nvSpPr>
-          <p:cNvPr id="575" name="Sending SBOM via CURL"/>
+          <p:cNvPr id="579" name="Sending SBOM via CURL"/>
           <p:cNvSpPr txBox="1">
             <a:spLocks noGrp="1"/>
           </p:cNvSpPr>
@@ -24400,7 +24519,7 @@
       </p:sp>
       <p:sp>
         <p:nvSpPr>
-          <p:cNvPr id="576" name="South Florida Developer Conference  (SoFlo Dev Con 2024)        Saturday, May 4, 2024"/>
+          <p:cNvPr id="580" name="South Florida Developer Conference  (SoFlo Dev Con 2024)        Saturday, May 4, 2024"/>
           <p:cNvSpPr txBox="1"/>
           <p:nvPr/>
         </p:nvSpPr>
@@ -24452,7 +24571,7 @@
       </p:sp>
       <p:sp>
         <p:nvSpPr>
-          <p:cNvPr id="577" name="curl -X &quot;POST&quot; &quot;http://localhost:8081/api/v1/bom&quot; ^…"/>
+          <p:cNvPr id="581" name="curl -X &quot;POST&quot; &quot;http://localhost:8081/api/v1/bom&quot; ^…"/>
           <p:cNvSpPr txBox="1"/>
           <p:nvPr/>
         </p:nvSpPr>
@@ -24550,7 +24669,7 @@
       </p:sp>
       <p:sp>
         <p:nvSpPr>
-          <p:cNvPr id="578" name="* Window batch file example"/>
+          <p:cNvPr id="582" name="* Window batch file example"/>
           <p:cNvSpPr txBox="1"/>
           <p:nvPr/>
         </p:nvSpPr>
@@ -24622,7 +24741,7 @@
       </p:grpSpPr>
       <p:sp>
         <p:nvSpPr>
-          <p:cNvPr id="196" name="Slide Number"/>
+          <p:cNvPr id="200" name="Slide Number"/>
           <p:cNvSpPr txBox="1">
             <a:spLocks noGrp="1"/>
           </p:cNvSpPr>
@@ -24669,7 +24788,7 @@
       </p:sp>
       <p:sp>
         <p:nvSpPr>
-          <p:cNvPr id="197" name="Source: Synopsys Open Source Security and Risk Report 2024"/>
+          <p:cNvPr id="201" name="Source: Synopsys Open Source Security and Risk Report 2024"/>
           <p:cNvSpPr txBox="1"/>
           <p:nvPr/>
         </p:nvSpPr>
@@ -24727,7 +24846,7 @@
       </p:sp>
       <p:pic>
         <p:nvPicPr>
-          <p:cNvPr id="198" name="84-percent.pdf" descr="84-percent.pdf"/>
+          <p:cNvPr id="202" name="84-percent.pdf" descr="84-percent.pdf"/>
           <p:cNvPicPr>
             <a:picLocks noChangeAspect="1"/>
           </p:cNvPicPr>
@@ -24756,7 +24875,7 @@
       </p:pic>
       <p:sp>
         <p:nvSpPr>
-          <p:cNvPr id="199" name="South Florida Developer Conference  (SoFlo Dev Con 2024)        Saturday, May 4, 2024"/>
+          <p:cNvPr id="203" name="South Florida Developer Conference  (SoFlo Dev Con 2024)        Saturday, May 4, 2024"/>
           <p:cNvSpPr txBox="1"/>
           <p:nvPr/>
         </p:nvSpPr>
@@ -24808,7 +24927,7 @@
       </p:sp>
       <p:sp>
         <p:nvSpPr>
-          <p:cNvPr id="200" name="Open SourcE Exposure"/>
+          <p:cNvPr id="204" name="Open SourcE Exposure"/>
           <p:cNvSpPr txBox="1">
             <a:spLocks noGrp="1"/>
           </p:cNvSpPr>
@@ -24854,7 +24973,7 @@
       </p:sp>
       <p:pic>
         <p:nvPicPr>
-          <p:cNvPr id="201" name="54-percent-increase.pdf" descr="54-percent-increase.pdf"/>
+          <p:cNvPr id="205" name="54-percent-increase.pdf" descr="54-percent-increase.pdf"/>
           <p:cNvPicPr>
             <a:picLocks noChangeAspect="1"/>
           </p:cNvPicPr>
@@ -24883,7 +25002,7 @@
       </p:pic>
       <p:pic>
         <p:nvPicPr>
-          <p:cNvPr id="202" name="96-percent.pdf" descr="96-percent.pdf"/>
+          <p:cNvPr id="206" name="96-percent.pdf" descr="96-percent.pdf"/>
           <p:cNvPicPr>
             <a:picLocks noChangeAspect="1"/>
           </p:cNvPicPr>
@@ -24949,7 +25068,7 @@
       </p:grpSpPr>
       <p:sp>
         <p:nvSpPr>
-          <p:cNvPr id="580" name="Slide Number"/>
+          <p:cNvPr id="584" name="Slide Number"/>
           <p:cNvSpPr txBox="1">
             <a:spLocks noGrp="1"/>
           </p:cNvSpPr>
@@ -24996,7 +25115,7 @@
       </p:sp>
       <p:sp>
         <p:nvSpPr>
-          <p:cNvPr id="581" name="DEPendency TRACK"/>
+          <p:cNvPr id="585" name="DEPendency TRACK"/>
           <p:cNvSpPr txBox="1">
             <a:spLocks noGrp="1"/>
           </p:cNvSpPr>
@@ -25040,7 +25159,7 @@
       </p:sp>
       <p:sp>
         <p:nvSpPr>
-          <p:cNvPr id="582" name="South Florida Developer Conference  (SoFlo Dev Con 2024)        Saturday, May 4, 2024"/>
+          <p:cNvPr id="586" name="South Florida Developer Conference  (SoFlo Dev Con 2024)        Saturday, May 4, 2024"/>
           <p:cNvSpPr txBox="1"/>
           <p:nvPr/>
         </p:nvSpPr>
@@ -25092,7 +25211,7 @@
       </p:sp>
       <p:sp>
         <p:nvSpPr>
-          <p:cNvPr id="583" name="DeMO TIME!"/>
+          <p:cNvPr id="587" name="DeMO TIME!"/>
           <p:cNvSpPr txBox="1"/>
           <p:nvPr/>
         </p:nvSpPr>
@@ -25179,7 +25298,7 @@
       </p:grpSpPr>
       <p:sp>
         <p:nvSpPr>
-          <p:cNvPr id="587" name="Thank You"/>
+          <p:cNvPr id="591" name="Thank You"/>
           <p:cNvSpPr txBox="1"/>
           <p:nvPr/>
         </p:nvSpPr>
@@ -25223,7 +25342,7 @@
       </p:sp>
       <p:sp>
         <p:nvSpPr>
-          <p:cNvPr id="588" name="SOFTWARE Composition Analysis"/>
+          <p:cNvPr id="592" name="SOFTWARE Composition Analysis"/>
           <p:cNvSpPr txBox="1">
             <a:spLocks noGrp="1"/>
           </p:cNvSpPr>
@@ -25267,7 +25386,7 @@
       </p:sp>
       <p:sp>
         <p:nvSpPr>
-          <p:cNvPr id="589" name="Slide Number"/>
+          <p:cNvPr id="593" name="Slide Number"/>
           <p:cNvSpPr txBox="1">
             <a:spLocks noGrp="1"/>
           </p:cNvSpPr>
@@ -25314,7 +25433,7 @@
       </p:sp>
       <p:sp>
         <p:nvSpPr>
-          <p:cNvPr id="590" name="www.linkedin.com/in/ealvarez"/>
+          <p:cNvPr id="594" name="www.linkedin.com/in/ealvarez"/>
           <p:cNvSpPr txBox="1"/>
           <p:nvPr/>
         </p:nvSpPr>
@@ -25367,7 +25486,7 @@
       </p:sp>
       <p:sp>
         <p:nvSpPr>
-          <p:cNvPr id="591" name="South Florida Developer Conference (SoFlo Dev Con)"/>
+          <p:cNvPr id="595" name="South Florida Developer Conference (SoFlo Dev Con)"/>
           <p:cNvSpPr txBox="1"/>
           <p:nvPr/>
         </p:nvSpPr>
@@ -25411,7 +25530,7 @@
       </p:sp>
       <p:pic>
         <p:nvPicPr>
-          <p:cNvPr id="592" name="LinkedIn_URL-Black-Background.png" descr="LinkedIn_URL-Black-Background.png"/>
+          <p:cNvPr id="596" name="LinkedIn_URL-Black-Background.png" descr="LinkedIn_URL-Black-Background.png"/>
           <p:cNvPicPr>
             <a:picLocks noChangeAspect="1"/>
           </p:cNvPicPr>
@@ -25440,7 +25559,7 @@
       </p:pic>
       <p:sp>
         <p:nvSpPr>
-          <p:cNvPr id="593" name="South Florida Developer Conference  (SoFlo Dev Con 2024)        Saturday, May 4, 2024"/>
+          <p:cNvPr id="597" name="South Florida Developer Conference  (SoFlo Dev Con 2024)        Saturday, May 4, 2024"/>
           <p:cNvSpPr txBox="1"/>
           <p:nvPr/>
         </p:nvSpPr>
@@ -25529,7 +25648,7 @@
       </p:grpSpPr>
       <p:sp>
         <p:nvSpPr>
-          <p:cNvPr id="595" name="REFERENCES"/>
+          <p:cNvPr id="599" name="REFERENCES"/>
           <p:cNvSpPr txBox="1">
             <a:spLocks noGrp="1"/>
           </p:cNvSpPr>
@@ -25569,7 +25688,7 @@
       </p:sp>
       <p:sp>
         <p:nvSpPr>
-          <p:cNvPr id="596" name="Synopsys 2024 Open Source Security and Risk Analysis Report (OSSRA)…"/>
+          <p:cNvPr id="600" name="Synopsys 2024 Open Source Security and Risk Analysis Report (OSSRA)…"/>
           <p:cNvSpPr txBox="1">
             <a:spLocks noGrp="1"/>
           </p:cNvSpPr>
@@ -26001,7 +26120,7 @@
       </p:sp>
       <p:sp>
         <p:nvSpPr>
-          <p:cNvPr id="597" name="Slide Number"/>
+          <p:cNvPr id="601" name="Slide Number"/>
           <p:cNvSpPr txBox="1">
             <a:spLocks noGrp="1"/>
           </p:cNvSpPr>
@@ -26048,7 +26167,7 @@
       </p:sp>
       <p:sp>
         <p:nvSpPr>
-          <p:cNvPr id="598" name="South Florida Developer Conference  (SoFlo Dev Con 2024)        Saturday, May 4, 2024"/>
+          <p:cNvPr id="602" name="South Florida Developer Conference  (SoFlo Dev Con 2024)        Saturday, May 4, 2024"/>
           <p:cNvSpPr txBox="1"/>
           <p:nvPr/>
         </p:nvSpPr>
@@ -26137,7 +26256,7 @@
       </p:grpSpPr>
       <p:sp>
         <p:nvSpPr>
-          <p:cNvPr id="600" name="REFERENCES"/>
+          <p:cNvPr id="604" name="REFERENCES"/>
           <p:cNvSpPr txBox="1">
             <a:spLocks noGrp="1"/>
           </p:cNvSpPr>
@@ -26177,7 +26296,7 @@
       </p:sp>
       <p:sp>
         <p:nvSpPr>
-          <p:cNvPr id="601" name="System Package Data Exchange (SPDX®) (SBOM) Standard…"/>
+          <p:cNvPr id="605" name="System Package Data Exchange (SPDX®) (SBOM) Standard…"/>
           <p:cNvSpPr txBox="1">
             <a:spLocks noGrp="1"/>
           </p:cNvSpPr>
@@ -26373,7 +26492,19 @@
                   </a:extLst>
                 </a:hlinkClick>
               </a:rPr>
-              <a:t>https://www.whitehouse.gov/briefing-room/presidential-actions/2021/05/12/executive-order-on-improving-the-nations-cybersecurity/</a:t>
+              <a:t>https://www.whitehouse.gov/briefing-room/presidential-actions/2021/05/12/executive-order-on-improving-the-nations-cybersecurity</a:t>
+            </a:r>
+            <a:r>
+              <a:rPr u="sng" dirty="0">
+                <a:hlinkClick r:id="rId4">
+                  <a:extLst>
+                    <a:ext uri="{A12FA001-AC4F-418D-AE19-62706E023703}">
+                      <ahyp:hlinkClr xmlns:ahyp="http://schemas.microsoft.com/office/drawing/2018/hyperlinkcolor" val="tx"/>
+                    </a:ext>
+                  </a:extLst>
+                </a:hlinkClick>
+              </a:rPr>
+              <a:t>/</a:t>
             </a:r>
           </a:p>
           <a:p>
@@ -26581,7 +26712,7 @@
       </p:sp>
       <p:sp>
         <p:nvSpPr>
-          <p:cNvPr id="602" name="Slide Number"/>
+          <p:cNvPr id="606" name="Slide Number"/>
           <p:cNvSpPr txBox="1">
             <a:spLocks noGrp="1"/>
           </p:cNvSpPr>
@@ -26628,7 +26759,7 @@
       </p:sp>
       <p:sp>
         <p:nvSpPr>
-          <p:cNvPr id="603" name="South Florida Developer Conference  (SoFlo Dev Con 2024)        Saturday, May 4, 2024"/>
+          <p:cNvPr id="607" name="South Florida Developer Conference  (SoFlo Dev Con 2024)        Saturday, May 4, 2024"/>
           <p:cNvSpPr txBox="1"/>
           <p:nvPr/>
         </p:nvSpPr>
@@ -26717,7 +26848,7 @@
       </p:grpSpPr>
       <p:sp>
         <p:nvSpPr>
-          <p:cNvPr id="605" name="REFERENCES"/>
+          <p:cNvPr id="609" name="REFERENCES"/>
           <p:cNvSpPr txBox="1">
             <a:spLocks noGrp="1"/>
           </p:cNvSpPr>
@@ -26757,7 +26888,7 @@
       </p:sp>
       <p:sp>
         <p:nvSpPr>
-          <p:cNvPr id="606" name="The Register: AI hallucinates software packages…"/>
+          <p:cNvPr id="610" name="The Register: AI hallucinates software packages…"/>
           <p:cNvSpPr txBox="1">
             <a:spLocks noGrp="1"/>
           </p:cNvSpPr>
@@ -27300,7 +27431,7 @@
       </p:sp>
       <p:sp>
         <p:nvSpPr>
-          <p:cNvPr id="607" name="Slide Number"/>
+          <p:cNvPr id="611" name="Slide Number"/>
           <p:cNvSpPr txBox="1">
             <a:spLocks noGrp="1"/>
           </p:cNvSpPr>
@@ -27347,7 +27478,7 @@
       </p:sp>
       <p:sp>
         <p:nvSpPr>
-          <p:cNvPr id="608" name="South Florida Developer Conference  (SoFlo Dev Con 2024)        Saturday, May 4, 2024"/>
+          <p:cNvPr id="612" name="South Florida Developer Conference  (SoFlo Dev Con 2024)        Saturday, May 4, 2024"/>
           <p:cNvSpPr txBox="1"/>
           <p:nvPr/>
         </p:nvSpPr>
@@ -27436,7 +27567,7 @@
       </p:grpSpPr>
       <p:sp>
         <p:nvSpPr>
-          <p:cNvPr id="206" name="Open Source COMPONENTS…"/>
+          <p:cNvPr id="210" name="Open Source COMPONENTS…"/>
           <p:cNvSpPr txBox="1">
             <a:spLocks noGrp="1"/>
           </p:cNvSpPr>
@@ -27502,7 +27633,7 @@
       </p:sp>
       <p:sp>
         <p:nvSpPr>
-          <p:cNvPr id="207" name="Slide Number"/>
+          <p:cNvPr id="211" name="Slide Number"/>
           <p:cNvSpPr txBox="1">
             <a:spLocks noGrp="1"/>
           </p:cNvSpPr>
@@ -27549,7 +27680,7 @@
       </p:sp>
       <p:graphicFrame>
         <p:nvGraphicFramePr>
-          <p:cNvPr id="208" name="2D Stacked Column Chart"/>
+          <p:cNvPr id="212" name="2D Stacked Column Chart"/>
           <p:cNvGraphicFramePr/>
           <p:nvPr/>
         </p:nvGraphicFramePr>
@@ -27565,7 +27696,7 @@
       </p:graphicFrame>
       <p:sp>
         <p:nvSpPr>
-          <p:cNvPr id="209" name="Source: Meta-analysis from Synopsys BlackDuck Open Source Security and Risk Reports 2016-2024"/>
+          <p:cNvPr id="213" name="Source: Meta-analysis from Synopsys BlackDuck Open Source Security and Risk Reports 2016-2024"/>
           <p:cNvSpPr txBox="1"/>
           <p:nvPr/>
         </p:nvSpPr>
@@ -27632,7 +27763,7 @@
       </p:sp>
       <p:sp>
         <p:nvSpPr>
-          <p:cNvPr id="210" name="South Florida Developer Conference  (SoFlo Dev Con 2024)        Saturday, May 4, 2024"/>
+          <p:cNvPr id="214" name="South Florida Developer Conference  (SoFlo Dev Con 2024)        Saturday, May 4, 2024"/>
           <p:cNvSpPr txBox="1"/>
           <p:nvPr/>
         </p:nvSpPr>
@@ -27721,7 +27852,7 @@
       </p:grpSpPr>
       <p:sp>
         <p:nvSpPr>
-          <p:cNvPr id="214" name="Why so Many Open Source COMPONENTS"/>
+          <p:cNvPr id="218" name="Why so Many Open Source COMPONENTS"/>
           <p:cNvSpPr txBox="1">
             <a:spLocks noGrp="1"/>
           </p:cNvSpPr>
@@ -27765,7 +27896,7 @@
       </p:sp>
       <p:sp>
         <p:nvSpPr>
-          <p:cNvPr id="215" name="Slide Number"/>
+          <p:cNvPr id="219" name="Slide Number"/>
           <p:cNvSpPr txBox="1">
             <a:spLocks noGrp="1"/>
           </p:cNvSpPr>
@@ -27812,7 +27943,7 @@
       </p:sp>
       <p:sp>
         <p:nvSpPr>
-          <p:cNvPr id="216" name="South Florida Developer Conference  (SoFlo Dev Con 2024)        Saturday, May 4, 2024"/>
+          <p:cNvPr id="220" name="South Florida Developer Conference  (SoFlo Dev Con 2024)        Saturday, May 4, 2024"/>
           <p:cNvSpPr txBox="1"/>
           <p:nvPr/>
         </p:nvSpPr>
@@ -27864,7 +27995,7 @@
       </p:sp>
       <p:sp>
         <p:nvSpPr>
-          <p:cNvPr id="217" name="Median of 683…"/>
+          <p:cNvPr id="221" name="Median of 683…"/>
           <p:cNvSpPr txBox="1">
             <a:spLocks noGrp="1"/>
           </p:cNvSpPr>
@@ -27988,7 +28119,7 @@
       </p:sp>
       <p:sp>
         <p:nvSpPr>
-          <p:cNvPr id="218" name="AVERAGE OF 526…"/>
+          <p:cNvPr id="222" name="AVERAGE OF 526…"/>
           <p:cNvSpPr txBox="1"/>
           <p:nvPr/>
         </p:nvSpPr>
@@ -28080,7 +28211,7 @@
       </p:sp>
       <p:sp>
         <p:nvSpPr>
-          <p:cNvPr id="219" name="Average of 148…"/>
+          <p:cNvPr id="223" name="Average of 148…"/>
           <p:cNvSpPr txBox="1"/>
           <p:nvPr/>
         </p:nvSpPr>
@@ -28262,7 +28393,7 @@
                                       <p:cBhvr>
                                         <p:cTn id="6" fill="hold"/>
                                         <p:tgtEl>
-                                          <p:spTgt spid="218"/>
+                                          <p:spTgt spid="222"/>
                                         </p:tgtEl>
                                         <p:attrNameLst>
                                           <p:attrName>style.visibility</p:attrName>
@@ -28306,7 +28437,7 @@
                                       <p:cBhvr>
                                         <p:cTn id="10" fill="hold"/>
                                         <p:tgtEl>
-                                          <p:spTgt spid="219"/>
+                                          <p:spTgt spid="223"/>
                                         </p:tgtEl>
                                         <p:attrNameLst>
                                           <p:attrName>style.visibility</p:attrName>
@@ -28350,7 +28481,7 @@
                                       <p:cBhvr>
                                         <p:cTn id="14" fill="hold"/>
                                         <p:tgtEl>
-                                          <p:spTgt spid="217"/>
+                                          <p:spTgt spid="221"/>
                                         </p:tgtEl>
                                         <p:attrNameLst>
                                           <p:attrName>style.visibility</p:attrName>
@@ -28391,9 +28522,9 @@
       </p:par>
     </p:tnLst>
     <p:bldLst>
-      <p:bldP spid="217" grpId="3" animBg="1" advAuto="0"/>
-      <p:bldP spid="218" grpId="1" animBg="1" advAuto="0"/>
-      <p:bldP spid="219" grpId="2" animBg="1" advAuto="0"/>
+      <p:bldP spid="221" grpId="3" animBg="1" advAuto="0"/>
+      <p:bldP spid="222" grpId="1" animBg="1" advAuto="0"/>
+      <p:bldP spid="223" grpId="2" animBg="1" advAuto="0"/>
     </p:bldLst>
   </p:timing>
 </p:sld>
@@ -28418,7 +28549,7 @@
       </p:grpSpPr>
       <p:sp>
         <p:nvSpPr>
-          <p:cNvPr id="223" name="Transitive Dependencies"/>
+          <p:cNvPr id="227" name="Transitive Dependencies"/>
           <p:cNvSpPr txBox="1">
             <a:spLocks noGrp="1"/>
           </p:cNvSpPr>
@@ -28458,7 +28589,7 @@
       </p:sp>
       <p:sp>
         <p:nvSpPr>
-          <p:cNvPr id="224" name="“Do you realize how many dependencies?”"/>
+          <p:cNvPr id="228" name="“Do you realize how many dependencies?”"/>
           <p:cNvSpPr txBox="1">
             <a:spLocks noGrp="1"/>
           </p:cNvSpPr>
@@ -28494,7 +28625,7 @@
       </p:sp>
       <p:grpSp>
         <p:nvGrpSpPr>
-          <p:cNvPr id="227" name="Group"/>
+          <p:cNvPr id="231" name="Group"/>
           <p:cNvGrpSpPr/>
           <p:nvPr/>
         </p:nvGrpSpPr>
@@ -28508,7 +28639,7 @@
         </p:grpSpPr>
         <p:sp>
           <p:nvSpPr>
-            <p:cNvPr id="225" name="Rectangle"/>
+            <p:cNvPr id="229" name="Rectangle"/>
             <p:cNvSpPr/>
             <p:nvPr/>
           </p:nvSpPr>
@@ -28554,7 +28685,7 @@
         </p:sp>
         <p:sp>
           <p:nvSpPr>
-            <p:cNvPr id="226" name="A"/>
+            <p:cNvPr id="230" name="A"/>
             <p:cNvSpPr txBox="1"/>
             <p:nvPr/>
           </p:nvSpPr>
@@ -28605,7 +28736,7 @@
       </p:grpSp>
       <p:grpSp>
         <p:nvGrpSpPr>
-          <p:cNvPr id="230" name="Group"/>
+          <p:cNvPr id="234" name="Group"/>
           <p:cNvGrpSpPr/>
           <p:nvPr/>
         </p:nvGrpSpPr>
@@ -28619,7 +28750,7 @@
         </p:grpSpPr>
         <p:sp>
           <p:nvSpPr>
-            <p:cNvPr id="228" name="Rectangle"/>
+            <p:cNvPr id="232" name="Rectangle"/>
             <p:cNvSpPr/>
             <p:nvPr/>
           </p:nvSpPr>
@@ -28666,7 +28797,7 @@
         </p:sp>
         <p:sp>
           <p:nvSpPr>
-            <p:cNvPr id="229" name="B"/>
+            <p:cNvPr id="233" name="B"/>
             <p:cNvSpPr txBox="1"/>
             <p:nvPr/>
           </p:nvSpPr>
@@ -28717,7 +28848,7 @@
       </p:grpSp>
       <p:grpSp>
         <p:nvGrpSpPr>
-          <p:cNvPr id="233" name="Group"/>
+          <p:cNvPr id="237" name="Group"/>
           <p:cNvGrpSpPr/>
           <p:nvPr/>
         </p:nvGrpSpPr>
@@ -28731,7 +28862,7 @@
         </p:grpSpPr>
         <p:sp>
           <p:nvSpPr>
-            <p:cNvPr id="231" name="Rectangle"/>
+            <p:cNvPr id="235" name="Rectangle"/>
             <p:cNvSpPr/>
             <p:nvPr/>
           </p:nvSpPr>
@@ -28777,7 +28908,7 @@
         </p:sp>
         <p:sp>
           <p:nvSpPr>
-            <p:cNvPr id="232" name="C"/>
+            <p:cNvPr id="236" name="C"/>
             <p:cNvSpPr txBox="1"/>
             <p:nvPr/>
           </p:nvSpPr>
@@ -28828,7 +28959,7 @@
       </p:grpSp>
       <p:grpSp>
         <p:nvGrpSpPr>
-          <p:cNvPr id="236" name="Group"/>
+          <p:cNvPr id="240" name="Group"/>
           <p:cNvGrpSpPr/>
           <p:nvPr/>
         </p:nvGrpSpPr>
@@ -28842,7 +28973,7 @@
         </p:grpSpPr>
         <p:sp>
           <p:nvSpPr>
-            <p:cNvPr id="234" name="Square"/>
+            <p:cNvPr id="238" name="Square"/>
             <p:cNvSpPr/>
             <p:nvPr/>
           </p:nvSpPr>
@@ -28888,7 +29019,7 @@
         </p:sp>
         <p:sp>
           <p:nvSpPr>
-            <p:cNvPr id="235" name="AA"/>
+            <p:cNvPr id="239" name="AA"/>
             <p:cNvSpPr txBox="1"/>
             <p:nvPr/>
           </p:nvSpPr>
@@ -28939,7 +29070,7 @@
       </p:grpSp>
       <p:grpSp>
         <p:nvGrpSpPr>
-          <p:cNvPr id="239" name="Group"/>
+          <p:cNvPr id="243" name="Group"/>
           <p:cNvGrpSpPr/>
           <p:nvPr/>
         </p:nvGrpSpPr>
@@ -28953,7 +29084,7 @@
         </p:grpSpPr>
         <p:sp>
           <p:nvSpPr>
-            <p:cNvPr id="237" name="Square"/>
+            <p:cNvPr id="241" name="Square"/>
             <p:cNvSpPr/>
             <p:nvPr/>
           </p:nvSpPr>
@@ -29000,7 +29131,7 @@
         </p:sp>
         <p:sp>
           <p:nvSpPr>
-            <p:cNvPr id="238" name="AB"/>
+            <p:cNvPr id="242" name="AB"/>
             <p:cNvSpPr txBox="1"/>
             <p:nvPr/>
           </p:nvSpPr>
@@ -29051,7 +29182,7 @@
       </p:grpSp>
       <p:grpSp>
         <p:nvGrpSpPr>
-          <p:cNvPr id="242" name="Group"/>
+          <p:cNvPr id="246" name="Group"/>
           <p:cNvGrpSpPr/>
           <p:nvPr/>
         </p:nvGrpSpPr>
@@ -29065,7 +29196,7 @@
         </p:grpSpPr>
         <p:sp>
           <p:nvSpPr>
-            <p:cNvPr id="240" name="Square"/>
+            <p:cNvPr id="244" name="Square"/>
             <p:cNvSpPr/>
             <p:nvPr/>
           </p:nvSpPr>
@@ -29111,7 +29242,7 @@
         </p:sp>
         <p:sp>
           <p:nvSpPr>
-            <p:cNvPr id="241" name="BC"/>
+            <p:cNvPr id="245" name="BC"/>
             <p:cNvSpPr txBox="1"/>
             <p:nvPr/>
           </p:nvSpPr>
@@ -29162,7 +29293,7 @@
       </p:grpSp>
       <p:grpSp>
         <p:nvGrpSpPr>
-          <p:cNvPr id="245" name="Group"/>
+          <p:cNvPr id="249" name="Group"/>
           <p:cNvGrpSpPr/>
           <p:nvPr/>
         </p:nvGrpSpPr>
@@ -29176,7 +29307,7 @@
         </p:grpSpPr>
         <p:sp>
           <p:nvSpPr>
-            <p:cNvPr id="243" name="Square"/>
+            <p:cNvPr id="247" name="Square"/>
             <p:cNvSpPr/>
             <p:nvPr/>
           </p:nvSpPr>
@@ -29222,7 +29353,7 @@
         </p:sp>
         <p:sp>
           <p:nvSpPr>
-            <p:cNvPr id="244" name="CA"/>
+            <p:cNvPr id="248" name="CA"/>
             <p:cNvSpPr txBox="1"/>
             <p:nvPr/>
           </p:nvSpPr>
@@ -29273,7 +29404,7 @@
       </p:grpSp>
       <p:grpSp>
         <p:nvGrpSpPr>
-          <p:cNvPr id="248" name="Group"/>
+          <p:cNvPr id="252" name="Group"/>
           <p:cNvGrpSpPr/>
           <p:nvPr/>
         </p:nvGrpSpPr>
@@ -29287,7 +29418,7 @@
         </p:grpSpPr>
         <p:sp>
           <p:nvSpPr>
-            <p:cNvPr id="246" name="Square"/>
+            <p:cNvPr id="250" name="Square"/>
             <p:cNvSpPr/>
             <p:nvPr/>
           </p:nvSpPr>
@@ -29334,7 +29465,7 @@
         </p:sp>
         <p:sp>
           <p:nvSpPr>
-            <p:cNvPr id="247" name="CB"/>
+            <p:cNvPr id="251" name="CB"/>
             <p:cNvSpPr txBox="1"/>
             <p:nvPr/>
           </p:nvSpPr>
@@ -29385,7 +29516,7 @@
       </p:grpSp>
       <p:grpSp>
         <p:nvGrpSpPr>
-          <p:cNvPr id="251" name="Group"/>
+          <p:cNvPr id="255" name="Group"/>
           <p:cNvGrpSpPr/>
           <p:nvPr/>
         </p:nvGrpSpPr>
@@ -29399,7 +29530,7 @@
         </p:grpSpPr>
         <p:sp>
           <p:nvSpPr>
-            <p:cNvPr id="249" name="Square"/>
+            <p:cNvPr id="253" name="Square"/>
             <p:cNvSpPr/>
             <p:nvPr/>
           </p:nvSpPr>
@@ -29445,7 +29576,7 @@
         </p:sp>
         <p:sp>
           <p:nvSpPr>
-            <p:cNvPr id="250" name="CC"/>
+            <p:cNvPr id="254" name="CC"/>
             <p:cNvSpPr txBox="1"/>
             <p:nvPr/>
           </p:nvSpPr>
@@ -29496,7 +29627,7 @@
       </p:grpSp>
       <p:sp>
         <p:nvSpPr>
-          <p:cNvPr id="252" name="Slide Number"/>
+          <p:cNvPr id="256" name="Slide Number"/>
           <p:cNvSpPr txBox="1">
             <a:spLocks noGrp="1"/>
           </p:cNvSpPr>
@@ -29543,7 +29674,7 @@
       </p:sp>
       <p:grpSp>
         <p:nvGrpSpPr>
-          <p:cNvPr id="255" name="Group"/>
+          <p:cNvPr id="259" name="Group"/>
           <p:cNvGrpSpPr/>
           <p:nvPr/>
         </p:nvGrpSpPr>
@@ -29557,7 +29688,7 @@
         </p:grpSpPr>
         <p:sp>
           <p:nvSpPr>
-            <p:cNvPr id="253" name="Rectangle"/>
+            <p:cNvPr id="257" name="Rectangle"/>
             <p:cNvSpPr/>
             <p:nvPr/>
           </p:nvSpPr>
@@ -29603,7 +29734,7 @@
         </p:sp>
         <p:sp>
           <p:nvSpPr>
-            <p:cNvPr id="254" name="App"/>
+            <p:cNvPr id="258" name="App"/>
             <p:cNvSpPr txBox="1"/>
             <p:nvPr/>
           </p:nvSpPr>
@@ -29654,7 +29785,7 @@
       </p:grpSp>
       <p:sp>
         <p:nvSpPr>
-          <p:cNvPr id="274" name="Connection Line"/>
+          <p:cNvPr id="278" name="Connection Line"/>
           <p:cNvSpPr/>
           <p:nvPr/>
         </p:nvSpPr>
@@ -29713,7 +29844,7 @@
       </p:sp>
       <p:sp>
         <p:nvSpPr>
-          <p:cNvPr id="275" name="Connection Line"/>
+          <p:cNvPr id="279" name="Connection Line"/>
           <p:cNvSpPr/>
           <p:nvPr/>
         </p:nvSpPr>
@@ -29772,7 +29903,7 @@
       </p:sp>
       <p:sp>
         <p:nvSpPr>
-          <p:cNvPr id="276" name="Connection Line"/>
+          <p:cNvPr id="280" name="Connection Line"/>
           <p:cNvSpPr/>
           <p:nvPr/>
         </p:nvSpPr>
@@ -29831,7 +29962,7 @@
       </p:sp>
       <p:sp>
         <p:nvSpPr>
-          <p:cNvPr id="277" name="Connection Line"/>
+          <p:cNvPr id="281" name="Connection Line"/>
           <p:cNvSpPr/>
           <p:nvPr/>
         </p:nvSpPr>
@@ -29888,7 +30019,7 @@
       </p:sp>
       <p:sp>
         <p:nvSpPr>
-          <p:cNvPr id="278" name="Connection Line"/>
+          <p:cNvPr id="282" name="Connection Line"/>
           <p:cNvSpPr/>
           <p:nvPr/>
         </p:nvSpPr>
@@ -29945,7 +30076,7 @@
       </p:sp>
       <p:sp>
         <p:nvSpPr>
-          <p:cNvPr id="279" name="Connection Line"/>
+          <p:cNvPr id="283" name="Connection Line"/>
           <p:cNvSpPr/>
           <p:nvPr/>
         </p:nvSpPr>
@@ -30002,7 +30133,7 @@
       </p:sp>
       <p:sp>
         <p:nvSpPr>
-          <p:cNvPr id="280" name="Connection Line"/>
+          <p:cNvPr id="284" name="Connection Line"/>
           <p:cNvSpPr/>
           <p:nvPr/>
         </p:nvSpPr>
@@ -30059,7 +30190,7 @@
       </p:sp>
       <p:grpSp>
         <p:nvGrpSpPr>
-          <p:cNvPr id="265" name="Group"/>
+          <p:cNvPr id="269" name="Group"/>
           <p:cNvGrpSpPr/>
           <p:nvPr/>
         </p:nvGrpSpPr>
@@ -30073,7 +30204,7 @@
         </p:grpSpPr>
         <p:sp>
           <p:nvSpPr>
-            <p:cNvPr id="263" name="Square"/>
+            <p:cNvPr id="267" name="Square"/>
             <p:cNvSpPr/>
             <p:nvPr/>
           </p:nvSpPr>
@@ -30119,7 +30250,7 @@
         </p:sp>
         <p:sp>
           <p:nvSpPr>
-            <p:cNvPr id="264" name="BCA"/>
+            <p:cNvPr id="268" name="BCA"/>
             <p:cNvSpPr txBox="1"/>
             <p:nvPr/>
           </p:nvSpPr>
@@ -30170,7 +30301,7 @@
       </p:grpSp>
       <p:grpSp>
         <p:nvGrpSpPr>
-          <p:cNvPr id="268" name="Group"/>
+          <p:cNvPr id="272" name="Group"/>
           <p:cNvGrpSpPr/>
           <p:nvPr/>
         </p:nvGrpSpPr>
@@ -30184,7 +30315,7 @@
         </p:grpSpPr>
         <p:sp>
           <p:nvSpPr>
-            <p:cNvPr id="266" name="Square"/>
+            <p:cNvPr id="270" name="Square"/>
             <p:cNvSpPr/>
             <p:nvPr/>
           </p:nvSpPr>
@@ -30231,7 +30362,7 @@
         </p:sp>
         <p:sp>
           <p:nvSpPr>
-            <p:cNvPr id="267" name="BCB"/>
+            <p:cNvPr id="271" name="BCB"/>
             <p:cNvSpPr txBox="1"/>
             <p:nvPr/>
           </p:nvSpPr>
@@ -30282,7 +30413,7 @@
       </p:grpSp>
       <p:sp>
         <p:nvSpPr>
-          <p:cNvPr id="281" name="Connection Line"/>
+          <p:cNvPr id="285" name="Connection Line"/>
           <p:cNvSpPr/>
           <p:nvPr/>
         </p:nvSpPr>
@@ -30339,7 +30470,7 @@
       </p:sp>
       <p:sp>
         <p:nvSpPr>
-          <p:cNvPr id="282" name="Connection Line"/>
+          <p:cNvPr id="286" name="Connection Line"/>
           <p:cNvSpPr/>
           <p:nvPr/>
         </p:nvSpPr>
@@ -30396,7 +30527,7 @@
       </p:sp>
       <p:sp>
         <p:nvSpPr>
-          <p:cNvPr id="283" name="Connection Line"/>
+          <p:cNvPr id="287" name="Connection Line"/>
           <p:cNvSpPr/>
           <p:nvPr/>
         </p:nvSpPr>
@@ -30453,7 +30584,7 @@
       </p:sp>
       <p:sp>
         <p:nvSpPr>
-          <p:cNvPr id="284" name="Connection Line"/>
+          <p:cNvPr id="288" name="Connection Line"/>
           <p:cNvSpPr/>
           <p:nvPr/>
         </p:nvSpPr>
@@ -30510,7 +30641,7 @@
       </p:sp>
       <p:sp>
         <p:nvSpPr>
-          <p:cNvPr id="273" name="South Florida Developer Conference  (SoFlo Dev Con 2024)        Saturday, May 4, 2024"/>
+          <p:cNvPr id="277" name="South Florida Developer Conference  (SoFlo Dev Con 2024)        Saturday, May 4, 2024"/>
           <p:cNvSpPr txBox="1"/>
           <p:nvPr/>
         </p:nvSpPr>
@@ -30599,7 +30730,7 @@
       </p:grpSpPr>
       <p:sp>
         <p:nvSpPr>
-          <p:cNvPr id="286" name="“A Jedi uses the Force for knowledge and defense, never for attack.”"/>
+          <p:cNvPr id="290" name="“A Jedi uses the Force for knowledge and defense, never for attack.”"/>
           <p:cNvSpPr txBox="1">
             <a:spLocks noGrp="1"/>
           </p:cNvSpPr>
@@ -30645,7 +30776,7 @@
       </p:sp>
       <p:sp>
         <p:nvSpPr>
-          <p:cNvPr id="287" name="Slide Number"/>
+          <p:cNvPr id="291" name="Slide Number"/>
           <p:cNvSpPr txBox="1">
             <a:spLocks noGrp="1"/>
           </p:cNvSpPr>
@@ -30692,7 +30823,7 @@
       </p:sp>
       <p:sp>
         <p:nvSpPr>
-          <p:cNvPr id="288" name="Source: https://www.starwars.com/news/the-starwars-com-10-best-yoda-quotes…"/>
+          <p:cNvPr id="292" name="Source: https://www.starwars.com/news/the-starwars-com-10-best-yoda-quotes…"/>
           <p:cNvSpPr txBox="1"/>
           <p:nvPr/>
         </p:nvSpPr>
@@ -30784,7 +30915,7 @@
       </p:sp>
       <p:pic>
         <p:nvPicPr>
-          <p:cNvPr id="289" name="Yoda_01-400x225.jpg" descr="Yoda_01-400x225.jpg"/>
+          <p:cNvPr id="293" name="Yoda_01-400x225.jpg" descr="Yoda_01-400x225.jpg"/>
           <p:cNvPicPr>
             <a:picLocks noChangeAspect="1"/>
           </p:cNvPicPr>
@@ -30813,7 +30944,7 @@
       </p:pic>
       <p:sp>
         <p:nvSpPr>
-          <p:cNvPr id="290" name="South Florida Developer Conference  (SoFlo Dev Con 2024)        Saturday, May 4, 2024"/>
+          <p:cNvPr id="294" name="South Florida Developer Conference  (SoFlo Dev Con 2024)        Saturday, May 4, 2024"/>
           <p:cNvSpPr txBox="1"/>
           <p:nvPr/>
         </p:nvSpPr>
@@ -30902,7 +31033,7 @@
       </p:grpSpPr>
       <p:sp>
         <p:nvSpPr>
-          <p:cNvPr id="292" name="secure Coding TOol Chest"/>
+          <p:cNvPr id="296" name="secure Coding TOol Chest"/>
           <p:cNvSpPr txBox="1">
             <a:spLocks noGrp="1"/>
           </p:cNvSpPr>
@@ -30946,7 +31077,7 @@
       </p:sp>
       <p:sp>
         <p:nvSpPr>
-          <p:cNvPr id="293" name="Slide Number"/>
+          <p:cNvPr id="297" name="Slide Number"/>
           <p:cNvSpPr txBox="1">
             <a:spLocks noGrp="1"/>
           </p:cNvSpPr>
@@ -30993,7 +31124,7 @@
       </p:sp>
       <p:sp>
         <p:nvSpPr>
-          <p:cNvPr id="294" name="SAST: Static Application Security Testing…"/>
+          <p:cNvPr id="298" name="SAST: Static Application Security Testing…"/>
           <p:cNvSpPr txBox="1">
             <a:spLocks noGrp="1"/>
           </p:cNvSpPr>
@@ -31074,7 +31205,7 @@
       </p:sp>
       <p:pic>
         <p:nvPicPr>
-          <p:cNvPr id="295" name="SAST-DAST-SCA-700x362-30.jpg" descr="SAST-DAST-SCA-700x362-30.jpg"/>
+          <p:cNvPr id="299" name="SAST-DAST-SCA-700x362-30.jpg" descr="SAST-DAST-SCA-700x362-30.jpg"/>
           <p:cNvPicPr>
             <a:picLocks noChangeAspect="1"/>
           </p:cNvPicPr>
@@ -31103,7 +31234,7 @@
       </p:pic>
       <p:sp>
         <p:nvSpPr>
-          <p:cNvPr id="296" name="South Florida Developer Conference  (SoFlo Dev Con 2024)        Saturday, May 4, 2024"/>
+          <p:cNvPr id="300" name="South Florida Developer Conference  (SoFlo Dev Con 2024)        Saturday, May 4, 2024"/>
           <p:cNvSpPr txBox="1"/>
           <p:nvPr/>
         </p:nvSpPr>
@@ -31203,7 +31334,7 @@
                                       <p:cBhvr>
                                         <p:cTn id="6" fill="hold"/>
                                         <p:tgtEl>
-                                          <p:spTgt spid="294">
+                                          <p:spTgt spid="298">
                                             <p:bg/>
                                           </p:spTgt>
                                         </p:tgtEl>
@@ -31231,7 +31362,7 @@
                                       <p:cBhvr>
                                         <p:cTn id="8" fill="hold"/>
                                         <p:tgtEl>
-                                          <p:spTgt spid="294">
+                                          <p:spTgt spid="298">
                                             <p:txEl>
                                               <p:pRg st="0" end="0"/>
                                             </p:txEl>
@@ -31279,7 +31410,7 @@
                                       <p:cBhvr>
                                         <p:cTn id="12" fill="hold"/>
                                         <p:tgtEl>
-                                          <p:spTgt spid="294">
+                                          <p:spTgt spid="298">
                                             <p:txEl>
                                               <p:pRg st="1" end="1"/>
                                             </p:txEl>
@@ -31327,7 +31458,7 @@
                                       <p:cBhvr>
                                         <p:cTn id="16" fill="hold"/>
                                         <p:tgtEl>
-                                          <p:spTgt spid="294">
+                                          <p:spTgt spid="298">
                                             <p:txEl>
                                               <p:pRg st="2" end="2"/>
                                             </p:txEl>
@@ -31372,7 +31503,7 @@
       </p:par>
     </p:tnLst>
     <p:bldLst>
-      <p:bldP spid="294" grpId="1" build="p" bldLvl="5" animBg="1" advAuto="0"/>
+      <p:bldP spid="298" grpId="1" build="p" bldLvl="5" animBg="1" advAuto="0"/>
     </p:bldLst>
   </p:timing>
 </p:sld>

</xml_diff>